<commit_message>
Proceso de Gestión de la Configuración
</commit_message>
<xml_diff>
--- a/Area_de_Proceso-CM/PGC/PGC_V1.1_2015.pptx
+++ b/Area_de_Proceso-CM/PGC/PGC_V1.1_2015.pptx
@@ -4316,7 +4316,7 @@
           <a:p>
             <a:fld id="{56F99C03-A70A-4B29-84B2-81DDC41A991A}" type="datetimeFigureOut">
               <a:rPr lang="es-PE" smtClean="0"/>
-              <a:t>5/11/2015</a:t>
+              <a:t>15/11/2015</a:t>
             </a:fld>
             <a:endParaRPr lang="es-PE"/>
           </a:p>
@@ -5868,7 +5868,7 @@
           <a:p>
             <a:fld id="{216C5678-EE20-4FA5-88E2-6E0BD67A2E26}" type="datetime1">
               <a:rPr lang="en-US" smtClean="0"/>
-              <a:t>11/5/2015</a:t>
+              <a:t>11/15/2015</a:t>
             </a:fld>
             <a:endParaRPr lang="en-US" dirty="0"/>
           </a:p>
@@ -6038,7 +6038,7 @@
           <a:p>
             <a:fld id="{EA051B39-B140-43FE-96DB-472A2B59CE7C}" type="datetime1">
               <a:rPr lang="en-US" smtClean="0"/>
-              <a:t>11/5/2015</a:t>
+              <a:t>11/15/2015</a:t>
             </a:fld>
             <a:endParaRPr lang="en-US"/>
           </a:p>
@@ -6218,7 +6218,7 @@
           <a:p>
             <a:fld id="{DA600BB2-27C5-458B-ABCE-839C88CF47CE}" type="datetime1">
               <a:rPr lang="en-US" smtClean="0"/>
-              <a:t>11/5/2015</a:t>
+              <a:t>11/15/2015</a:t>
             </a:fld>
             <a:endParaRPr lang="en-US"/>
           </a:p>
@@ -6406,7 +6406,7 @@
           <a:p>
             <a:fld id="{B11D738E-8962-435F-8C43-147B8DD7E819}" type="datetime1">
               <a:rPr lang="en-US" smtClean="0"/>
-              <a:t>11/5/2015</a:t>
+              <a:t>11/15/2015</a:t>
             </a:fld>
             <a:endParaRPr lang="en-US"/>
           </a:p>
@@ -6673,7 +6673,7 @@
           <a:p>
             <a:fld id="{09CAEA93-55E7-4DA9-90C2-089A26EEFEC4}" type="datetime1">
               <a:rPr lang="en-US" smtClean="0"/>
-              <a:t>11/5/2015</a:t>
+              <a:t>11/15/2015</a:t>
             </a:fld>
             <a:endParaRPr lang="en-US"/>
           </a:p>
@@ -7026,7 +7026,7 @@
           <a:p>
             <a:fld id="{E34CF3C7-6809-4F39-BD67-A75817BDDE0A}" type="datetime1">
               <a:rPr lang="en-US" smtClean="0"/>
-              <a:t>11/5/2015</a:t>
+              <a:t>11/15/2015</a:t>
             </a:fld>
             <a:endParaRPr lang="en-US"/>
           </a:p>
@@ -7339,7 +7339,7 @@
           <a:p>
             <a:fld id="{F7EAEB24-CE78-465C-A726-91D0868FA48F}" type="datetime1">
               <a:rPr lang="en-US" smtClean="0"/>
-              <a:t>11/5/2015</a:t>
+              <a:t>11/15/2015</a:t>
             </a:fld>
             <a:endParaRPr lang="en-US"/>
           </a:p>
@@ -7571,7 +7571,7 @@
           <a:p>
             <a:fld id="{40BAADF0-1749-4E8B-9691-B44A5F8C0895}" type="datetime1">
               <a:rPr lang="en-US" smtClean="0"/>
-              <a:t>11/5/2015</a:t>
+              <a:t>11/15/2015</a:t>
             </a:fld>
             <a:endParaRPr lang="en-US"/>
           </a:p>
@@ -7666,7 +7666,7 @@
           <a:p>
             <a:fld id="{A8AF628A-A867-4937-BBE5-207DB6F9C51A}" type="datetime1">
               <a:rPr lang="en-US" smtClean="0"/>
-              <a:t>11/5/2015</a:t>
+              <a:t>11/15/2015</a:t>
             </a:fld>
             <a:endParaRPr lang="en-US"/>
           </a:p>
@@ -7959,7 +7959,7 @@
           <a:p>
             <a:fld id="{118BBB94-68E6-4675-A946-F1C5994EDBD7}" type="datetime1">
               <a:rPr lang="en-US" smtClean="0"/>
-              <a:t>11/5/2015</a:t>
+              <a:t>11/15/2015</a:t>
             </a:fld>
             <a:endParaRPr lang="en-US"/>
           </a:p>
@@ -8233,7 +8233,7 @@
           <a:p>
             <a:fld id="{DC3B8377-21E3-4835-B75D-4E2847E2750F}" type="datetime1">
               <a:rPr lang="en-US" smtClean="0"/>
-              <a:t>11/5/2015</a:t>
+              <a:t>11/15/2015</a:t>
             </a:fld>
             <a:endParaRPr lang="en-US"/>
           </a:p>
@@ -8448,7 +8448,7 @@
           <a:p>
             <a:fld id="{B0C4986D-6BE9-4264-908F-02DB36FD8D6C}" type="datetime1">
               <a:rPr lang="en-US" smtClean="0"/>
-              <a:t>11/5/2015</a:t>
+              <a:t>11/15/2015</a:t>
             </a:fld>
             <a:endParaRPr lang="en-US" dirty="0"/>
           </a:p>
@@ -8989,7 +8989,7 @@
           <a:p>
             <a:fld id="{216C5678-EE20-4FA5-88E2-6E0BD67A2E26}" type="datetime1">
               <a:rPr lang="en-US" smtClean="0"/>
-              <a:t>11/5/2015</a:t>
+              <a:t>11/15/2015</a:t>
             </a:fld>
             <a:endParaRPr lang="en-US" dirty="0"/>
           </a:p>
@@ -9499,7 +9499,7 @@
           <a:p>
             <a:fld id="{216C5678-EE20-4FA5-88E2-6E0BD67A2E26}" type="datetime1">
               <a:rPr lang="en-US" smtClean="0"/>
-              <a:t>11/5/2015</a:t>
+              <a:t>11/15/2015</a:t>
             </a:fld>
             <a:endParaRPr lang="en-US" dirty="0"/>
           </a:p>
@@ -10003,7 +10003,7 @@
           <a:p>
             <a:fld id="{216C5678-EE20-4FA5-88E2-6E0BD67A2E26}" type="datetime1">
               <a:rPr lang="en-US" smtClean="0"/>
-              <a:t>11/5/2015</a:t>
+              <a:t>11/15/2015</a:t>
             </a:fld>
             <a:endParaRPr lang="en-US" dirty="0"/>
           </a:p>
@@ -10194,7 +10194,7 @@
           <a:p>
             <a:fld id="{216C5678-EE20-4FA5-88E2-6E0BD67A2E26}" type="datetime1">
               <a:rPr lang="en-US" smtClean="0"/>
-              <a:t>11/5/2015</a:t>
+              <a:t>11/15/2015</a:t>
             </a:fld>
             <a:endParaRPr lang="en-US" dirty="0"/>
           </a:p>
@@ -10446,7 +10446,7 @@
           <a:p>
             <a:fld id="{216C5678-EE20-4FA5-88E2-6E0BD67A2E26}" type="datetime1">
               <a:rPr lang="en-US" smtClean="0"/>
-              <a:t>11/5/2015</a:t>
+              <a:t>11/15/2015</a:t>
             </a:fld>
             <a:endParaRPr lang="en-US" dirty="0"/>
           </a:p>
@@ -12585,42 +12585,42 @@
                 <a:gridCol w="208280">
                   <a:extLst>
                     <a:ext uri="{9D8B030D-6E8A-4147-A177-3AD203B41FA5}">
-                      <a16:colId xmlns:a16="http://schemas.microsoft.com/office/drawing/2014/main" val="20000"/>
+                      <a16:colId xmlns:a16="http://schemas.microsoft.com/office/drawing/2014/main" xmlns="" val="20000"/>
                     </a:ext>
                   </a:extLst>
                 </a:gridCol>
                 <a:gridCol w="1303888">
                   <a:extLst>
                     <a:ext uri="{9D8B030D-6E8A-4147-A177-3AD203B41FA5}">
-                      <a16:colId xmlns:a16="http://schemas.microsoft.com/office/drawing/2014/main" val="20001"/>
+                      <a16:colId xmlns:a16="http://schemas.microsoft.com/office/drawing/2014/main" xmlns="" val="20001"/>
                     </a:ext>
                   </a:extLst>
                 </a:gridCol>
                 <a:gridCol w="1296144">
                   <a:extLst>
                     <a:ext uri="{9D8B030D-6E8A-4147-A177-3AD203B41FA5}">
-                      <a16:colId xmlns:a16="http://schemas.microsoft.com/office/drawing/2014/main" val="20002"/>
+                      <a16:colId xmlns:a16="http://schemas.microsoft.com/office/drawing/2014/main" xmlns="" val="20002"/>
                     </a:ext>
                   </a:extLst>
                 </a:gridCol>
                 <a:gridCol w="2952328">
                   <a:extLst>
                     <a:ext uri="{9D8B030D-6E8A-4147-A177-3AD203B41FA5}">
-                      <a16:colId xmlns:a16="http://schemas.microsoft.com/office/drawing/2014/main" val="20003"/>
+                      <a16:colId xmlns:a16="http://schemas.microsoft.com/office/drawing/2014/main" xmlns="" val="20003"/>
                     </a:ext>
                   </a:extLst>
                 </a:gridCol>
                 <a:gridCol w="1872208">
                   <a:extLst>
                     <a:ext uri="{9D8B030D-6E8A-4147-A177-3AD203B41FA5}">
-                      <a16:colId xmlns:a16="http://schemas.microsoft.com/office/drawing/2014/main" val="20004"/>
+                      <a16:colId xmlns:a16="http://schemas.microsoft.com/office/drawing/2014/main" xmlns="" val="20004"/>
                     </a:ext>
                   </a:extLst>
                 </a:gridCol>
                 <a:gridCol w="1188155">
                   <a:extLst>
                     <a:ext uri="{9D8B030D-6E8A-4147-A177-3AD203B41FA5}">
-                      <a16:colId xmlns:a16="http://schemas.microsoft.com/office/drawing/2014/main" val="20005"/>
+                      <a16:colId xmlns:a16="http://schemas.microsoft.com/office/drawing/2014/main" xmlns="" val="20005"/>
                     </a:ext>
                   </a:extLst>
                 </a:gridCol>
@@ -12778,7 +12778,7 @@
                 </a:tc>
                 <a:extLst>
                   <a:ext uri="{0D108BD9-81ED-4DB2-BD59-A6C34878D82A}">
-                    <a16:rowId xmlns:a16="http://schemas.microsoft.com/office/drawing/2014/main" val="10000"/>
+                    <a16:rowId xmlns:a16="http://schemas.microsoft.com/office/drawing/2014/main" xmlns="" val="10000"/>
                   </a:ext>
                 </a:extLst>
               </a:tr>
@@ -13144,7 +13144,7 @@
                 </a:tc>
                 <a:extLst>
                   <a:ext uri="{0D108BD9-81ED-4DB2-BD59-A6C34878D82A}">
-                    <a16:rowId xmlns:a16="http://schemas.microsoft.com/office/drawing/2014/main" val="10001"/>
+                    <a16:rowId xmlns:a16="http://schemas.microsoft.com/office/drawing/2014/main" xmlns="" val="10001"/>
                   </a:ext>
                 </a:extLst>
               </a:tr>
@@ -13507,7 +13507,7 @@
                 </a:tc>
                 <a:extLst>
                   <a:ext uri="{0D108BD9-81ED-4DB2-BD59-A6C34878D82A}">
-                    <a16:rowId xmlns:a16="http://schemas.microsoft.com/office/drawing/2014/main" val="10002"/>
+                    <a16:rowId xmlns:a16="http://schemas.microsoft.com/office/drawing/2014/main" xmlns="" val="10002"/>
                   </a:ext>
                 </a:extLst>
               </a:tr>
@@ -13537,7 +13537,7 @@
           <a:p>
             <a:fld id="{216C5678-EE20-4FA5-88E2-6E0BD67A2E26}" type="datetime1">
               <a:rPr lang="en-US" smtClean="0"/>
-              <a:t>11/5/2015</a:t>
+              <a:t>11/15/2015</a:t>
             </a:fld>
             <a:endParaRPr lang="en-US" dirty="0"/>
           </a:p>
@@ -13900,7 +13900,7 @@
           <a:p>
             <a:fld id="{216C5678-EE20-4FA5-88E2-6E0BD67A2E26}" type="datetime1">
               <a:rPr lang="en-US" smtClean="0"/>
-              <a:t>11/5/2015</a:t>
+              <a:t>11/15/2015</a:t>
             </a:fld>
             <a:endParaRPr lang="en-US" dirty="0"/>
           </a:p>
@@ -16284,42 +16284,42 @@
                 <a:gridCol w="208280">
                   <a:extLst>
                     <a:ext uri="{9D8B030D-6E8A-4147-A177-3AD203B41FA5}">
-                      <a16:colId xmlns:a16="http://schemas.microsoft.com/office/drawing/2014/main" val="20000"/>
+                      <a16:colId xmlns:a16="http://schemas.microsoft.com/office/drawing/2014/main" xmlns="" val="20000"/>
                     </a:ext>
                   </a:extLst>
                 </a:gridCol>
                 <a:gridCol w="1303888">
                   <a:extLst>
                     <a:ext uri="{9D8B030D-6E8A-4147-A177-3AD203B41FA5}">
-                      <a16:colId xmlns:a16="http://schemas.microsoft.com/office/drawing/2014/main" val="20001"/>
+                      <a16:colId xmlns:a16="http://schemas.microsoft.com/office/drawing/2014/main" xmlns="" val="20001"/>
                     </a:ext>
                   </a:extLst>
                 </a:gridCol>
                 <a:gridCol w="1512168">
                   <a:extLst>
                     <a:ext uri="{9D8B030D-6E8A-4147-A177-3AD203B41FA5}">
-                      <a16:colId xmlns:a16="http://schemas.microsoft.com/office/drawing/2014/main" val="20002"/>
+                      <a16:colId xmlns:a16="http://schemas.microsoft.com/office/drawing/2014/main" xmlns="" val="20002"/>
                     </a:ext>
                   </a:extLst>
                 </a:gridCol>
                 <a:gridCol w="2808312">
                   <a:extLst>
                     <a:ext uri="{9D8B030D-6E8A-4147-A177-3AD203B41FA5}">
-                      <a16:colId xmlns:a16="http://schemas.microsoft.com/office/drawing/2014/main" val="20003"/>
+                      <a16:colId xmlns:a16="http://schemas.microsoft.com/office/drawing/2014/main" xmlns="" val="20003"/>
                     </a:ext>
                   </a:extLst>
                 </a:gridCol>
                 <a:gridCol w="1440160">
                   <a:extLst>
                     <a:ext uri="{9D8B030D-6E8A-4147-A177-3AD203B41FA5}">
-                      <a16:colId xmlns:a16="http://schemas.microsoft.com/office/drawing/2014/main" val="20004"/>
+                      <a16:colId xmlns:a16="http://schemas.microsoft.com/office/drawing/2014/main" xmlns="" val="20004"/>
                     </a:ext>
                   </a:extLst>
                 </a:gridCol>
                 <a:gridCol w="1542375">
                   <a:extLst>
                     <a:ext uri="{9D8B030D-6E8A-4147-A177-3AD203B41FA5}">
-                      <a16:colId xmlns:a16="http://schemas.microsoft.com/office/drawing/2014/main" val="20005"/>
+                      <a16:colId xmlns:a16="http://schemas.microsoft.com/office/drawing/2014/main" xmlns="" val="20005"/>
                     </a:ext>
                   </a:extLst>
                 </a:gridCol>
@@ -16477,7 +16477,7 @@
                 </a:tc>
                 <a:extLst>
                   <a:ext uri="{0D108BD9-81ED-4DB2-BD59-A6C34878D82A}">
-                    <a16:rowId xmlns:a16="http://schemas.microsoft.com/office/drawing/2014/main" val="10000"/>
+                    <a16:rowId xmlns:a16="http://schemas.microsoft.com/office/drawing/2014/main" xmlns="" val="10000"/>
                   </a:ext>
                 </a:extLst>
               </a:tr>
@@ -16838,7 +16838,7 @@
                 </a:tc>
                 <a:extLst>
                   <a:ext uri="{0D108BD9-81ED-4DB2-BD59-A6C34878D82A}">
-                    <a16:rowId xmlns:a16="http://schemas.microsoft.com/office/drawing/2014/main" val="10001"/>
+                    <a16:rowId xmlns:a16="http://schemas.microsoft.com/office/drawing/2014/main" xmlns="" val="10001"/>
                   </a:ext>
                 </a:extLst>
               </a:tr>
@@ -17129,7 +17129,7 @@
                 </a:tc>
                 <a:extLst>
                   <a:ext uri="{0D108BD9-81ED-4DB2-BD59-A6C34878D82A}">
-                    <a16:rowId xmlns:a16="http://schemas.microsoft.com/office/drawing/2014/main" val="10002"/>
+                    <a16:rowId xmlns:a16="http://schemas.microsoft.com/office/drawing/2014/main" xmlns="" val="10002"/>
                   </a:ext>
                 </a:extLst>
               </a:tr>
@@ -17159,7 +17159,7 @@
           <a:p>
             <a:fld id="{216C5678-EE20-4FA5-88E2-6E0BD67A2E26}" type="datetime1">
               <a:rPr lang="en-US" smtClean="0"/>
-              <a:t>11/5/2015</a:t>
+              <a:t>11/15/2015</a:t>
             </a:fld>
             <a:endParaRPr lang="en-US" dirty="0"/>
           </a:p>
@@ -17524,7 +17524,7 @@
           <a:p>
             <a:fld id="{216C5678-EE20-4FA5-88E2-6E0BD67A2E26}" type="datetime1">
               <a:rPr lang="en-US" smtClean="0"/>
-              <a:t>11/5/2015</a:t>
+              <a:t>11/15/2015</a:t>
             </a:fld>
             <a:endParaRPr lang="en-US" dirty="0"/>
           </a:p>
@@ -17678,7 +17678,18 @@
           <a:p>
             <a:r>
               <a:rPr lang="es-ES" sz="6300" dirty="0" smtClean="0"/>
-              <a:t>PROCESO DE GESTIÓN DE CONFIGURACIÓN</a:t>
+              <a:t>PGC</a:t>
+            </a:r>
+            <a:br>
+              <a:rPr lang="es-ES" sz="6300" dirty="0" smtClean="0"/>
+            </a:br>
+            <a:r>
+              <a:rPr lang="es-ES" sz="6300" dirty="0" smtClean="0"/>
+              <a:t>PROCESO </a:t>
+            </a:r>
+            <a:r>
+              <a:rPr lang="es-ES" sz="6300" dirty="0" smtClean="0"/>
+              <a:t>DE GESTIÓN DE CONFIGURACIÓN</a:t>
             </a:r>
             <a:endParaRPr lang="es-PE" sz="6300" dirty="0"/>
           </a:p>
@@ -17730,7 +17741,7 @@
           <a:p>
             <a:fld id="{216C5678-EE20-4FA5-88E2-6E0BD67A2E26}" type="datetime1">
               <a:rPr lang="en-US" smtClean="0"/>
-              <a:t>11/5/2015</a:t>
+              <a:t>11/15/2015</a:t>
             </a:fld>
             <a:endParaRPr lang="en-US" dirty="0"/>
           </a:p>
@@ -20692,42 +20703,42 @@
                 <a:gridCol w="216024">
                   <a:extLst>
                     <a:ext uri="{9D8B030D-6E8A-4147-A177-3AD203B41FA5}">
-                      <a16:colId xmlns:a16="http://schemas.microsoft.com/office/drawing/2014/main" val="20000"/>
+                      <a16:colId xmlns:a16="http://schemas.microsoft.com/office/drawing/2014/main" xmlns="" val="20000"/>
                     </a:ext>
                   </a:extLst>
                 </a:gridCol>
                 <a:gridCol w="1224136">
                   <a:extLst>
                     <a:ext uri="{9D8B030D-6E8A-4147-A177-3AD203B41FA5}">
-                      <a16:colId xmlns:a16="http://schemas.microsoft.com/office/drawing/2014/main" val="20001"/>
+                      <a16:colId xmlns:a16="http://schemas.microsoft.com/office/drawing/2014/main" xmlns="" val="20001"/>
                     </a:ext>
                   </a:extLst>
                 </a:gridCol>
                 <a:gridCol w="1368152">
                   <a:extLst>
                     <a:ext uri="{9D8B030D-6E8A-4147-A177-3AD203B41FA5}">
-                      <a16:colId xmlns:a16="http://schemas.microsoft.com/office/drawing/2014/main" val="20002"/>
+                      <a16:colId xmlns:a16="http://schemas.microsoft.com/office/drawing/2014/main" xmlns="" val="20002"/>
                     </a:ext>
                   </a:extLst>
                 </a:gridCol>
                 <a:gridCol w="2664296">
                   <a:extLst>
                     <a:ext uri="{9D8B030D-6E8A-4147-A177-3AD203B41FA5}">
-                      <a16:colId xmlns:a16="http://schemas.microsoft.com/office/drawing/2014/main" val="20003"/>
+                      <a16:colId xmlns:a16="http://schemas.microsoft.com/office/drawing/2014/main" xmlns="" val="20003"/>
                     </a:ext>
                   </a:extLst>
                 </a:gridCol>
                 <a:gridCol w="1800200">
                   <a:extLst>
                     <a:ext uri="{9D8B030D-6E8A-4147-A177-3AD203B41FA5}">
-                      <a16:colId xmlns:a16="http://schemas.microsoft.com/office/drawing/2014/main" val="20004"/>
+                      <a16:colId xmlns:a16="http://schemas.microsoft.com/office/drawing/2014/main" xmlns="" val="20004"/>
                     </a:ext>
                   </a:extLst>
                 </a:gridCol>
                 <a:gridCol w="1542375">
                   <a:extLst>
                     <a:ext uri="{9D8B030D-6E8A-4147-A177-3AD203B41FA5}">
-                      <a16:colId xmlns:a16="http://schemas.microsoft.com/office/drawing/2014/main" val="20005"/>
+                      <a16:colId xmlns:a16="http://schemas.microsoft.com/office/drawing/2014/main" xmlns="" val="20005"/>
                     </a:ext>
                   </a:extLst>
                 </a:gridCol>
@@ -20885,7 +20896,7 @@
                 </a:tc>
                 <a:extLst>
                   <a:ext uri="{0D108BD9-81ED-4DB2-BD59-A6C34878D82A}">
-                    <a16:rowId xmlns:a16="http://schemas.microsoft.com/office/drawing/2014/main" val="10000"/>
+                    <a16:rowId xmlns:a16="http://schemas.microsoft.com/office/drawing/2014/main" xmlns="" val="10000"/>
                   </a:ext>
                 </a:extLst>
               </a:tr>
@@ -21140,7 +21151,7 @@
                 </a:tc>
                 <a:extLst>
                   <a:ext uri="{0D108BD9-81ED-4DB2-BD59-A6C34878D82A}">
-                    <a16:rowId xmlns:a16="http://schemas.microsoft.com/office/drawing/2014/main" val="10001"/>
+                    <a16:rowId xmlns:a16="http://schemas.microsoft.com/office/drawing/2014/main" xmlns="" val="10001"/>
                   </a:ext>
                 </a:extLst>
               </a:tr>
@@ -21469,7 +21480,7 @@
                 </a:tc>
                 <a:extLst>
                   <a:ext uri="{0D108BD9-81ED-4DB2-BD59-A6C34878D82A}">
-                    <a16:rowId xmlns:a16="http://schemas.microsoft.com/office/drawing/2014/main" val="10002"/>
+                    <a16:rowId xmlns:a16="http://schemas.microsoft.com/office/drawing/2014/main" xmlns="" val="10002"/>
                   </a:ext>
                 </a:extLst>
               </a:tr>
@@ -21758,7 +21769,7 @@
                 </a:tc>
                 <a:extLst>
                   <a:ext uri="{0D108BD9-81ED-4DB2-BD59-A6C34878D82A}">
-                    <a16:rowId xmlns:a16="http://schemas.microsoft.com/office/drawing/2014/main" val="10003"/>
+                    <a16:rowId xmlns:a16="http://schemas.microsoft.com/office/drawing/2014/main" xmlns="" val="10003"/>
                   </a:ext>
                 </a:extLst>
               </a:tr>
@@ -21788,7 +21799,7 @@
           <a:p>
             <a:fld id="{216C5678-EE20-4FA5-88E2-6E0BD67A2E26}" type="datetime1">
               <a:rPr lang="en-US" smtClean="0"/>
-              <a:t>11/5/2015</a:t>
+              <a:t>11/15/2015</a:t>
             </a:fld>
             <a:endParaRPr lang="en-US" dirty="0"/>
           </a:p>
@@ -22060,42 +22071,42 @@
                 <a:gridCol w="216024">
                   <a:extLst>
                     <a:ext uri="{9D8B030D-6E8A-4147-A177-3AD203B41FA5}">
-                      <a16:colId xmlns:a16="http://schemas.microsoft.com/office/drawing/2014/main" val="20000"/>
+                      <a16:colId xmlns:a16="http://schemas.microsoft.com/office/drawing/2014/main" xmlns="" val="20000"/>
                     </a:ext>
                   </a:extLst>
                 </a:gridCol>
                 <a:gridCol w="1224136">
                   <a:extLst>
                     <a:ext uri="{9D8B030D-6E8A-4147-A177-3AD203B41FA5}">
-                      <a16:colId xmlns:a16="http://schemas.microsoft.com/office/drawing/2014/main" val="20001"/>
+                      <a16:colId xmlns:a16="http://schemas.microsoft.com/office/drawing/2014/main" xmlns="" val="20001"/>
                     </a:ext>
                   </a:extLst>
                 </a:gridCol>
                 <a:gridCol w="1440160">
                   <a:extLst>
                     <a:ext uri="{9D8B030D-6E8A-4147-A177-3AD203B41FA5}">
-                      <a16:colId xmlns:a16="http://schemas.microsoft.com/office/drawing/2014/main" val="20002"/>
+                      <a16:colId xmlns:a16="http://schemas.microsoft.com/office/drawing/2014/main" xmlns="" val="20002"/>
                     </a:ext>
                   </a:extLst>
                 </a:gridCol>
                 <a:gridCol w="3024336">
                   <a:extLst>
                     <a:ext uri="{9D8B030D-6E8A-4147-A177-3AD203B41FA5}">
-                      <a16:colId xmlns:a16="http://schemas.microsoft.com/office/drawing/2014/main" val="20003"/>
+                      <a16:colId xmlns:a16="http://schemas.microsoft.com/office/drawing/2014/main" xmlns="" val="20003"/>
                     </a:ext>
                   </a:extLst>
                 </a:gridCol>
                 <a:gridCol w="1656184">
                   <a:extLst>
                     <a:ext uri="{9D8B030D-6E8A-4147-A177-3AD203B41FA5}">
-                      <a16:colId xmlns:a16="http://schemas.microsoft.com/office/drawing/2014/main" val="20004"/>
+                      <a16:colId xmlns:a16="http://schemas.microsoft.com/office/drawing/2014/main" xmlns="" val="20004"/>
                     </a:ext>
                   </a:extLst>
                 </a:gridCol>
                 <a:gridCol w="1254343">
                   <a:extLst>
                     <a:ext uri="{9D8B030D-6E8A-4147-A177-3AD203B41FA5}">
-                      <a16:colId xmlns:a16="http://schemas.microsoft.com/office/drawing/2014/main" val="20005"/>
+                      <a16:colId xmlns:a16="http://schemas.microsoft.com/office/drawing/2014/main" xmlns="" val="20005"/>
                     </a:ext>
                   </a:extLst>
                 </a:gridCol>
@@ -22253,7 +22264,7 @@
                 </a:tc>
                 <a:extLst>
                   <a:ext uri="{0D108BD9-81ED-4DB2-BD59-A6C34878D82A}">
-                    <a16:rowId xmlns:a16="http://schemas.microsoft.com/office/drawing/2014/main" val="10000"/>
+                    <a16:rowId xmlns:a16="http://schemas.microsoft.com/office/drawing/2014/main" xmlns="" val="10000"/>
                   </a:ext>
                 </a:extLst>
               </a:tr>
@@ -22524,7 +22535,7 @@
                 </a:tc>
                 <a:extLst>
                   <a:ext uri="{0D108BD9-81ED-4DB2-BD59-A6C34878D82A}">
-                    <a16:rowId xmlns:a16="http://schemas.microsoft.com/office/drawing/2014/main" val="10001"/>
+                    <a16:rowId xmlns:a16="http://schemas.microsoft.com/office/drawing/2014/main" xmlns="" val="10001"/>
                   </a:ext>
                 </a:extLst>
               </a:tr>
@@ -22824,7 +22835,7 @@
                 </a:tc>
                 <a:extLst>
                   <a:ext uri="{0D108BD9-81ED-4DB2-BD59-A6C34878D82A}">
-                    <a16:rowId xmlns:a16="http://schemas.microsoft.com/office/drawing/2014/main" val="10002"/>
+                    <a16:rowId xmlns:a16="http://schemas.microsoft.com/office/drawing/2014/main" xmlns="" val="10002"/>
                   </a:ext>
                 </a:extLst>
               </a:tr>
@@ -23087,7 +23098,7 @@
                 </a:tc>
                 <a:extLst>
                   <a:ext uri="{0D108BD9-81ED-4DB2-BD59-A6C34878D82A}">
-                    <a16:rowId xmlns:a16="http://schemas.microsoft.com/office/drawing/2014/main" val="10003"/>
+                    <a16:rowId xmlns:a16="http://schemas.microsoft.com/office/drawing/2014/main" xmlns="" val="10003"/>
                   </a:ext>
                 </a:extLst>
               </a:tr>
@@ -23117,7 +23128,7 @@
           <a:p>
             <a:fld id="{216C5678-EE20-4FA5-88E2-6E0BD67A2E26}" type="datetime1">
               <a:rPr lang="en-US" smtClean="0"/>
-              <a:t>11/5/2015</a:t>
+              <a:t>11/15/2015</a:t>
             </a:fld>
             <a:endParaRPr lang="en-US" dirty="0"/>
           </a:p>
@@ -23457,7 +23468,7 @@
           <a:p>
             <a:fld id="{216C5678-EE20-4FA5-88E2-6E0BD67A2E26}" type="datetime1">
               <a:rPr lang="en-US" smtClean="0"/>
-              <a:t>11/5/2015</a:t>
+              <a:t>11/15/2015</a:t>
             </a:fld>
             <a:endParaRPr lang="en-US" dirty="0"/>
           </a:p>
@@ -23709,7 +23720,7 @@
           <a:p>
             <a:fld id="{216C5678-EE20-4FA5-88E2-6E0BD67A2E26}" type="datetime1">
               <a:rPr lang="en-US" smtClean="0"/>
-              <a:t>11/5/2015</a:t>
+              <a:t>11/15/2015</a:t>
             </a:fld>
             <a:endParaRPr lang="en-US" dirty="0"/>
           </a:p>
@@ -23958,7 +23969,7 @@
           <a:p>
             <a:fld id="{216C5678-EE20-4FA5-88E2-6E0BD67A2E26}" type="datetime1">
               <a:rPr lang="en-US" smtClean="0"/>
-              <a:t>11/5/2015</a:t>
+              <a:t>11/15/2015</a:t>
             </a:fld>
             <a:endParaRPr lang="en-US" dirty="0"/>
           </a:p>
@@ -24140,28 +24151,28 @@
                 <a:gridCol w="376595">
                   <a:extLst>
                     <a:ext uri="{9D8B030D-6E8A-4147-A177-3AD203B41FA5}">
-                      <a16:colId xmlns:a16="http://schemas.microsoft.com/office/drawing/2014/main" val="20000"/>
+                      <a16:colId xmlns:a16="http://schemas.microsoft.com/office/drawing/2014/main" xmlns="" val="20000"/>
                     </a:ext>
                   </a:extLst>
                 </a:gridCol>
                 <a:gridCol w="3112625">
                   <a:extLst>
                     <a:ext uri="{9D8B030D-6E8A-4147-A177-3AD203B41FA5}">
-                      <a16:colId xmlns:a16="http://schemas.microsoft.com/office/drawing/2014/main" val="20001"/>
+                      <a16:colId xmlns:a16="http://schemas.microsoft.com/office/drawing/2014/main" xmlns="" val="20001"/>
                     </a:ext>
                   </a:extLst>
                 </a:gridCol>
                 <a:gridCol w="3318298">
                   <a:extLst>
                     <a:ext uri="{9D8B030D-6E8A-4147-A177-3AD203B41FA5}">
-                      <a16:colId xmlns:a16="http://schemas.microsoft.com/office/drawing/2014/main" val="20002"/>
+                      <a16:colId xmlns:a16="http://schemas.microsoft.com/office/drawing/2014/main" xmlns="" val="20002"/>
                     </a:ext>
                   </a:extLst>
                 </a:gridCol>
                 <a:gridCol w="1400681">
                   <a:extLst>
                     <a:ext uri="{9D8B030D-6E8A-4147-A177-3AD203B41FA5}">
-                      <a16:colId xmlns:a16="http://schemas.microsoft.com/office/drawing/2014/main" val="20003"/>
+                      <a16:colId xmlns:a16="http://schemas.microsoft.com/office/drawing/2014/main" xmlns="" val="20003"/>
                     </a:ext>
                   </a:extLst>
                 </a:gridCol>
@@ -24537,7 +24548,7 @@
                 </a:tc>
                 <a:extLst>
                   <a:ext uri="{0D108BD9-81ED-4DB2-BD59-A6C34878D82A}">
-                    <a16:rowId xmlns:a16="http://schemas.microsoft.com/office/drawing/2014/main" val="10000"/>
+                    <a16:rowId xmlns:a16="http://schemas.microsoft.com/office/drawing/2014/main" xmlns="" val="10000"/>
                   </a:ext>
                 </a:extLst>
               </a:tr>
@@ -24901,7 +24912,7 @@
                 </a:tc>
                 <a:extLst>
                   <a:ext uri="{0D108BD9-81ED-4DB2-BD59-A6C34878D82A}">
-                    <a16:rowId xmlns:a16="http://schemas.microsoft.com/office/drawing/2014/main" val="10001"/>
+                    <a16:rowId xmlns:a16="http://schemas.microsoft.com/office/drawing/2014/main" xmlns="" val="10001"/>
                   </a:ext>
                 </a:extLst>
               </a:tr>
@@ -25254,7 +25265,7 @@
                 </a:tc>
                 <a:extLst>
                   <a:ext uri="{0D108BD9-81ED-4DB2-BD59-A6C34878D82A}">
-                    <a16:rowId xmlns:a16="http://schemas.microsoft.com/office/drawing/2014/main" val="10002"/>
+                    <a16:rowId xmlns:a16="http://schemas.microsoft.com/office/drawing/2014/main" xmlns="" val="10002"/>
                   </a:ext>
                 </a:extLst>
               </a:tr>
@@ -25604,7 +25615,7 @@
                 </a:tc>
                 <a:extLst>
                   <a:ext uri="{0D108BD9-81ED-4DB2-BD59-A6C34878D82A}">
-                    <a16:rowId xmlns:a16="http://schemas.microsoft.com/office/drawing/2014/main" val="10003"/>
+                    <a16:rowId xmlns:a16="http://schemas.microsoft.com/office/drawing/2014/main" xmlns="" val="10003"/>
                   </a:ext>
                 </a:extLst>
               </a:tr>
@@ -25797,7 +25808,7 @@
           <a:p>
             <a:fld id="{216C5678-EE20-4FA5-88E2-6E0BD67A2E26}" type="datetime1">
               <a:rPr lang="en-US" smtClean="0"/>
-              <a:t>11/5/2015</a:t>
+              <a:t>11/15/2015</a:t>
             </a:fld>
             <a:endParaRPr lang="en-US" dirty="0"/>
           </a:p>
@@ -25981,49 +25992,49 @@
                 <a:gridCol w="208280">
                   <a:extLst>
                     <a:ext uri="{9D8B030D-6E8A-4147-A177-3AD203B41FA5}">
-                      <a16:colId xmlns:a16="http://schemas.microsoft.com/office/drawing/2014/main" val="20000"/>
+                      <a16:colId xmlns:a16="http://schemas.microsoft.com/office/drawing/2014/main" xmlns="" val="20000"/>
                     </a:ext>
                   </a:extLst>
                 </a:gridCol>
                 <a:gridCol w="823239">
                   <a:extLst>
                     <a:ext uri="{9D8B030D-6E8A-4147-A177-3AD203B41FA5}">
-                      <a16:colId xmlns:a16="http://schemas.microsoft.com/office/drawing/2014/main" val="20001"/>
+                      <a16:colId xmlns:a16="http://schemas.microsoft.com/office/drawing/2014/main" xmlns="" val="20001"/>
                     </a:ext>
                   </a:extLst>
                 </a:gridCol>
                 <a:gridCol w="1224136">
                   <a:extLst>
                     <a:ext uri="{9D8B030D-6E8A-4147-A177-3AD203B41FA5}">
-                      <a16:colId xmlns:a16="http://schemas.microsoft.com/office/drawing/2014/main" val="20002"/>
+                      <a16:colId xmlns:a16="http://schemas.microsoft.com/office/drawing/2014/main" xmlns="" val="20002"/>
                     </a:ext>
                   </a:extLst>
                 </a:gridCol>
                 <a:gridCol w="1368152">
                   <a:extLst>
                     <a:ext uri="{9D8B030D-6E8A-4147-A177-3AD203B41FA5}">
-                      <a16:colId xmlns:a16="http://schemas.microsoft.com/office/drawing/2014/main" val="20003"/>
+                      <a16:colId xmlns:a16="http://schemas.microsoft.com/office/drawing/2014/main" xmlns="" val="20003"/>
                     </a:ext>
                   </a:extLst>
                 </a:gridCol>
                 <a:gridCol w="1368152">
                   <a:extLst>
                     <a:ext uri="{9D8B030D-6E8A-4147-A177-3AD203B41FA5}">
-                      <a16:colId xmlns:a16="http://schemas.microsoft.com/office/drawing/2014/main" val="20004"/>
+                      <a16:colId xmlns:a16="http://schemas.microsoft.com/office/drawing/2014/main" xmlns="" val="20004"/>
                     </a:ext>
                   </a:extLst>
                 </a:gridCol>
                 <a:gridCol w="1182851">
                   <a:extLst>
                     <a:ext uri="{9D8B030D-6E8A-4147-A177-3AD203B41FA5}">
-                      <a16:colId xmlns:a16="http://schemas.microsoft.com/office/drawing/2014/main" val="20005"/>
+                      <a16:colId xmlns:a16="http://schemas.microsoft.com/office/drawing/2014/main" xmlns="" val="20005"/>
                     </a:ext>
                   </a:extLst>
                 </a:gridCol>
                 <a:gridCol w="2527844">
                   <a:extLst>
                     <a:ext uri="{9D8B030D-6E8A-4147-A177-3AD203B41FA5}">
-                      <a16:colId xmlns:a16="http://schemas.microsoft.com/office/drawing/2014/main" val="20006"/>
+                      <a16:colId xmlns:a16="http://schemas.microsoft.com/office/drawing/2014/main" xmlns="" val="20006"/>
                     </a:ext>
                   </a:extLst>
                 </a:gridCol>
@@ -26212,7 +26223,7 @@
                 </a:tc>
                 <a:extLst>
                   <a:ext uri="{0D108BD9-81ED-4DB2-BD59-A6C34878D82A}">
-                    <a16:rowId xmlns:a16="http://schemas.microsoft.com/office/drawing/2014/main" val="10000"/>
+                    <a16:rowId xmlns:a16="http://schemas.microsoft.com/office/drawing/2014/main" xmlns="" val="10000"/>
                   </a:ext>
                 </a:extLst>
               </a:tr>
@@ -26357,14 +26368,6 @@
                         </a:rPr>
                         <a:t>Edwar Gaspar Sánchez</a:t>
                       </a:r>
-                      <a:endParaRPr lang="es-ES" sz="1200" b="1" kern="1200" dirty="0" smtClean="0">
-                        <a:solidFill>
-                          <a:schemeClr val="dk1"/>
-                        </a:solidFill>
-                        <a:latin typeface="+mj-lt"/>
-                        <a:ea typeface="Verdana" panose="020B0604030504040204" pitchFamily="34" charset="0"/>
-                        <a:cs typeface="Verdana" panose="020B0604030504040204" pitchFamily="34" charset="0"/>
-                      </a:endParaRPr>
                     </a:p>
                   </a:txBody>
                   <a:tcPr marT="45702" marB="45702" anchor="ctr" horzOverflow="overflow"/>
@@ -26456,14 +26459,6 @@
                         </a:rPr>
                         <a:t>APROBADO</a:t>
                       </a:r>
-                      <a:endParaRPr lang="es-ES" sz="1200" b="1" kern="1200" dirty="0" smtClean="0">
-                        <a:solidFill>
-                          <a:schemeClr val="dk1"/>
-                        </a:solidFill>
-                        <a:latin typeface="+mj-lt"/>
-                        <a:ea typeface="Verdana" panose="020B0604030504040204" pitchFamily="34" charset="0"/>
-                        <a:cs typeface="Verdana" panose="020B0604030504040204" pitchFamily="34" charset="0"/>
-                      </a:endParaRPr>
                     </a:p>
                   </a:txBody>
                   <a:tcPr marT="45702" marB="45702" anchor="ctr" horzOverflow="overflow"/>
@@ -26525,7 +26520,7 @@
                 </a:tc>
                 <a:extLst>
                   <a:ext uri="{0D108BD9-81ED-4DB2-BD59-A6C34878D82A}">
-                    <a16:rowId xmlns:a16="http://schemas.microsoft.com/office/drawing/2014/main" val="10001"/>
+                    <a16:rowId xmlns:a16="http://schemas.microsoft.com/office/drawing/2014/main" xmlns="" val="10001"/>
                   </a:ext>
                 </a:extLst>
               </a:tr>
@@ -26634,14 +26629,6 @@
                         </a:rPr>
                         <a:t>05/11/2015</a:t>
                       </a:r>
-                      <a:endParaRPr lang="es-ES" sz="1200" b="1" kern="1200" dirty="0" smtClean="0">
-                        <a:solidFill>
-                          <a:schemeClr val="dk1"/>
-                        </a:solidFill>
-                        <a:latin typeface="+mj-lt"/>
-                        <a:ea typeface="Verdana" panose="020B0604030504040204" pitchFamily="34" charset="0"/>
-                        <a:cs typeface="Verdana" panose="020B0604030504040204" pitchFamily="34" charset="0"/>
-                      </a:endParaRPr>
                     </a:p>
                   </a:txBody>
                   <a:tcPr marT="45702" marB="45702" anchor="ctr" horzOverflow="overflow"/>
@@ -26678,14 +26665,6 @@
                         </a:rPr>
                         <a:t>Edwar Gaspar Sánchez</a:t>
                       </a:r>
-                      <a:endParaRPr lang="es-ES" sz="1200" b="1" kern="1200" dirty="0" smtClean="0">
-                        <a:solidFill>
-                          <a:schemeClr val="dk1"/>
-                        </a:solidFill>
-                        <a:latin typeface="+mj-lt"/>
-                        <a:ea typeface="Verdana" panose="020B0604030504040204" pitchFamily="34" charset="0"/>
-                        <a:cs typeface="Verdana" panose="020B0604030504040204" pitchFamily="34" charset="0"/>
-                      </a:endParaRPr>
                     </a:p>
                   </a:txBody>
                   <a:tcPr marT="45702" marB="45702" anchor="ctr" horzOverflow="overflow"/>
@@ -26838,7 +26817,7 @@
                 </a:tc>
                 <a:extLst>
                   <a:ext uri="{0D108BD9-81ED-4DB2-BD59-A6C34878D82A}">
-                    <a16:rowId xmlns:a16="http://schemas.microsoft.com/office/drawing/2014/main" val="10002"/>
+                    <a16:rowId xmlns:a16="http://schemas.microsoft.com/office/drawing/2014/main" xmlns="" val="10002"/>
                   </a:ext>
                 </a:extLst>
               </a:tr>
@@ -27079,7 +27058,7 @@
                 </a:tc>
                 <a:extLst>
                   <a:ext uri="{0D108BD9-81ED-4DB2-BD59-A6C34878D82A}">
-                    <a16:rowId xmlns:a16="http://schemas.microsoft.com/office/drawing/2014/main" val="10003"/>
+                    <a16:rowId xmlns:a16="http://schemas.microsoft.com/office/drawing/2014/main" xmlns="" val="10003"/>
                   </a:ext>
                 </a:extLst>
               </a:tr>
@@ -27320,7 +27299,7 @@
                 </a:tc>
                 <a:extLst>
                   <a:ext uri="{0D108BD9-81ED-4DB2-BD59-A6C34878D82A}">
-                    <a16:rowId xmlns:a16="http://schemas.microsoft.com/office/drawing/2014/main" val="10004"/>
+                    <a16:rowId xmlns:a16="http://schemas.microsoft.com/office/drawing/2014/main" xmlns="" val="10004"/>
                   </a:ext>
                 </a:extLst>
               </a:tr>
@@ -27561,7 +27540,7 @@
                 </a:tc>
                 <a:extLst>
                   <a:ext uri="{0D108BD9-81ED-4DB2-BD59-A6C34878D82A}">
-                    <a16:rowId xmlns:a16="http://schemas.microsoft.com/office/drawing/2014/main" val="10005"/>
+                    <a16:rowId xmlns:a16="http://schemas.microsoft.com/office/drawing/2014/main" xmlns="" val="10005"/>
                   </a:ext>
                 </a:extLst>
               </a:tr>
@@ -27802,7 +27781,7 @@
                 </a:tc>
                 <a:extLst>
                   <a:ext uri="{0D108BD9-81ED-4DB2-BD59-A6C34878D82A}">
-                    <a16:rowId xmlns:a16="http://schemas.microsoft.com/office/drawing/2014/main" val="10006"/>
+                    <a16:rowId xmlns:a16="http://schemas.microsoft.com/office/drawing/2014/main" xmlns="" val="10006"/>
                   </a:ext>
                 </a:extLst>
               </a:tr>
@@ -28048,7 +28027,7 @@
           <a:p>
             <a:fld id="{216C5678-EE20-4FA5-88E2-6E0BD67A2E26}" type="datetime1">
               <a:rPr lang="en-US" smtClean="0"/>
-              <a:t>11/5/2015</a:t>
+              <a:t>11/15/2015</a:t>
             </a:fld>
             <a:endParaRPr lang="en-US" dirty="0"/>
           </a:p>
@@ -28607,7 +28586,7 @@
             <a:fld id="{216C5678-EE20-4FA5-88E2-6E0BD67A2E26}" type="datetime1">
               <a:rPr lang="en-US" smtClean="0"/>
               <a:pPr/>
-              <a:t>11/5/2015</a:t>
+              <a:t>11/15/2015</a:t>
             </a:fld>
             <a:endParaRPr lang="en-US" dirty="0"/>
           </a:p>
@@ -28695,7 +28674,7 @@
           <a:p>
             <a:fld id="{216C5678-EE20-4FA5-88E2-6E0BD67A2E26}" type="datetime1">
               <a:rPr lang="en-US" smtClean="0"/>
-              <a:t>11/5/2015</a:t>
+              <a:t>11/15/2015</a:t>
             </a:fld>
             <a:endParaRPr lang="en-US" dirty="0"/>
           </a:p>
@@ -30885,7 +30864,7 @@
           <a:p>
             <a:fld id="{216C5678-EE20-4FA5-88E2-6E0BD67A2E26}" type="datetime1">
               <a:rPr lang="en-US" smtClean="0"/>
-              <a:t>11/5/2015</a:t>
+              <a:t>11/15/2015</a:t>
             </a:fld>
             <a:endParaRPr lang="en-US" dirty="0"/>
           </a:p>
@@ -31223,7 +31202,7 @@
           <a:p>
             <a:fld id="{216C5678-EE20-4FA5-88E2-6E0BD67A2E26}" type="datetime1">
               <a:rPr lang="en-US" smtClean="0"/>
-              <a:t>11/5/2015</a:t>
+              <a:t>11/15/2015</a:t>
             </a:fld>
             <a:endParaRPr lang="en-US" dirty="0"/>
           </a:p>
@@ -31414,7 +31393,7 @@
           <a:p>
             <a:fld id="{216C5678-EE20-4FA5-88E2-6E0BD67A2E26}" type="datetime1">
               <a:rPr lang="en-US" smtClean="0"/>
-              <a:t>11/5/2015</a:t>
+              <a:t>11/15/2015</a:t>
             </a:fld>
             <a:endParaRPr lang="en-US" dirty="0"/>
           </a:p>
@@ -31598,21 +31577,21 @@
                 <a:gridCol w="371974">
                   <a:extLst>
                     <a:ext uri="{9D8B030D-6E8A-4147-A177-3AD203B41FA5}">
-                      <a16:colId xmlns:a16="http://schemas.microsoft.com/office/drawing/2014/main" val="20000"/>
+                      <a16:colId xmlns:a16="http://schemas.microsoft.com/office/drawing/2014/main" xmlns="" val="20000"/>
                     </a:ext>
                   </a:extLst>
                 </a:gridCol>
                 <a:gridCol w="1800774">
                   <a:extLst>
                     <a:ext uri="{9D8B030D-6E8A-4147-A177-3AD203B41FA5}">
-                      <a16:colId xmlns:a16="http://schemas.microsoft.com/office/drawing/2014/main" val="20001"/>
+                      <a16:colId xmlns:a16="http://schemas.microsoft.com/office/drawing/2014/main" xmlns="" val="20001"/>
                     </a:ext>
                   </a:extLst>
                 </a:gridCol>
                 <a:gridCol w="6540220">
                   <a:extLst>
                     <a:ext uri="{9D8B030D-6E8A-4147-A177-3AD203B41FA5}">
-                      <a16:colId xmlns:a16="http://schemas.microsoft.com/office/drawing/2014/main" val="20002"/>
+                      <a16:colId xmlns:a16="http://schemas.microsoft.com/office/drawing/2014/main" xmlns="" val="20002"/>
                     </a:ext>
                   </a:extLst>
                 </a:gridCol>
@@ -31695,7 +31674,7 @@
                 </a:tc>
                 <a:extLst>
                   <a:ext uri="{0D108BD9-81ED-4DB2-BD59-A6C34878D82A}">
-                    <a16:rowId xmlns:a16="http://schemas.microsoft.com/office/drawing/2014/main" val="10000"/>
+                    <a16:rowId xmlns:a16="http://schemas.microsoft.com/office/drawing/2014/main" xmlns="" val="10000"/>
                   </a:ext>
                 </a:extLst>
               </a:tr>
@@ -31835,7 +31814,7 @@
                 </a:tc>
                 <a:extLst>
                   <a:ext uri="{0D108BD9-81ED-4DB2-BD59-A6C34878D82A}">
-                    <a16:rowId xmlns:a16="http://schemas.microsoft.com/office/drawing/2014/main" val="10001"/>
+                    <a16:rowId xmlns:a16="http://schemas.microsoft.com/office/drawing/2014/main" xmlns="" val="10001"/>
                   </a:ext>
                 </a:extLst>
               </a:tr>
@@ -31956,7 +31935,7 @@
                 </a:tc>
                 <a:extLst>
                   <a:ext uri="{0D108BD9-81ED-4DB2-BD59-A6C34878D82A}">
-                    <a16:rowId xmlns:a16="http://schemas.microsoft.com/office/drawing/2014/main" val="10002"/>
+                    <a16:rowId xmlns:a16="http://schemas.microsoft.com/office/drawing/2014/main" xmlns="" val="10002"/>
                   </a:ext>
                 </a:extLst>
               </a:tr>
@@ -32096,7 +32075,7 @@
                 </a:tc>
                 <a:extLst>
                   <a:ext uri="{0D108BD9-81ED-4DB2-BD59-A6C34878D82A}">
-                    <a16:rowId xmlns:a16="http://schemas.microsoft.com/office/drawing/2014/main" val="10003"/>
+                    <a16:rowId xmlns:a16="http://schemas.microsoft.com/office/drawing/2014/main" xmlns="" val="10003"/>
                   </a:ext>
                 </a:extLst>
               </a:tr>
@@ -32239,7 +32218,7 @@
                 </a:tc>
                 <a:extLst>
                   <a:ext uri="{0D108BD9-81ED-4DB2-BD59-A6C34878D82A}">
-                    <a16:rowId xmlns:a16="http://schemas.microsoft.com/office/drawing/2014/main" val="10004"/>
+                    <a16:rowId xmlns:a16="http://schemas.microsoft.com/office/drawing/2014/main" xmlns="" val="10004"/>
                   </a:ext>
                 </a:extLst>
               </a:tr>
@@ -32411,7 +32390,7 @@
                 </a:tc>
                 <a:extLst>
                   <a:ext uri="{0D108BD9-81ED-4DB2-BD59-A6C34878D82A}">
-                    <a16:rowId xmlns:a16="http://schemas.microsoft.com/office/drawing/2014/main" val="10005"/>
+                    <a16:rowId xmlns:a16="http://schemas.microsoft.com/office/drawing/2014/main" xmlns="" val="10005"/>
                   </a:ext>
                 </a:extLst>
               </a:tr>
@@ -32554,7 +32533,7 @@
                 </a:tc>
                 <a:extLst>
                   <a:ext uri="{0D108BD9-81ED-4DB2-BD59-A6C34878D82A}">
-                    <a16:rowId xmlns:a16="http://schemas.microsoft.com/office/drawing/2014/main" val="10006"/>
+                    <a16:rowId xmlns:a16="http://schemas.microsoft.com/office/drawing/2014/main" xmlns="" val="10006"/>
                   </a:ext>
                 </a:extLst>
               </a:tr>
@@ -32675,7 +32654,7 @@
                 </a:tc>
                 <a:extLst>
                   <a:ext uri="{0D108BD9-81ED-4DB2-BD59-A6C34878D82A}">
-                    <a16:rowId xmlns:a16="http://schemas.microsoft.com/office/drawing/2014/main" val="10007"/>
+                    <a16:rowId xmlns:a16="http://schemas.microsoft.com/office/drawing/2014/main" xmlns="" val="10007"/>
                   </a:ext>
                 </a:extLst>
               </a:tr>
@@ -32705,7 +32684,7 @@
           <a:p>
             <a:fld id="{216C5678-EE20-4FA5-88E2-6E0BD67A2E26}" type="datetime1">
               <a:rPr lang="en-US" smtClean="0"/>
-              <a:t>11/5/2015</a:t>
+              <a:t>11/15/2015</a:t>
             </a:fld>
             <a:endParaRPr lang="en-US" dirty="0"/>
           </a:p>
@@ -32896,7 +32875,7 @@
           <a:p>
             <a:fld id="{216C5678-EE20-4FA5-88E2-6E0BD67A2E26}" type="datetime1">
               <a:rPr lang="en-US" smtClean="0"/>
-              <a:t>11/5/2015</a:t>
+              <a:t>11/15/2015</a:t>
             </a:fld>
             <a:endParaRPr lang="en-US" dirty="0"/>
           </a:p>
@@ -33096,7 +33075,7 @@
           <a:p>
             <a:fld id="{216C5678-EE20-4FA5-88E2-6E0BD67A2E26}" type="datetime1">
               <a:rPr lang="en-US" smtClean="0"/>
-              <a:t>11/5/2015</a:t>
+              <a:t>11/15/2015</a:t>
             </a:fld>
             <a:endParaRPr lang="en-US" dirty="0"/>
           </a:p>

</xml_diff>

<commit_message>
Proceso de Gestión de Calidad
</commit_message>
<xml_diff>
--- a/Area_de_Proceso-CM/PGC/PGC_V1.1_2015.pptx
+++ b/Area_de_Proceso-CM/PGC/PGC_V1.1_2015.pptx
@@ -1923,1046 +1923,6 @@
       <dsp:cNvGrpSpPr/>
     </dsp:nvGrpSpPr>
     <dsp:grpSpPr/>
-    <dsp:sp modelId="{55A4A5BB-6FD8-475A-835C-B4EB380A1BDF}">
-      <dsp:nvSpPr>
-        <dsp:cNvPr id="0" name=""/>
-        <dsp:cNvSpPr/>
-      </dsp:nvSpPr>
-      <dsp:spPr>
-        <a:xfrm rot="5400000">
-          <a:off x="4334260" y="-2503761"/>
-          <a:ext cx="1666061" cy="6941853"/>
-        </a:xfrm>
-        <a:prstGeom prst="round2SameRect">
-          <a:avLst/>
-        </a:prstGeom>
-        <a:solidFill>
-          <a:schemeClr val="dk2">
-            <a:alpha val="90000"/>
-            <a:tint val="40000"/>
-            <a:hueOff val="0"/>
-            <a:satOff val="0"/>
-            <a:lumOff val="0"/>
-            <a:alphaOff val="0"/>
-          </a:schemeClr>
-        </a:solidFill>
-        <a:ln w="28575" cap="flat" cmpd="sng" algn="ctr">
-          <a:solidFill>
-            <a:schemeClr val="dk2">
-              <a:alpha val="90000"/>
-              <a:tint val="40000"/>
-              <a:hueOff val="0"/>
-              <a:satOff val="0"/>
-              <a:lumOff val="0"/>
-              <a:alphaOff val="0"/>
-            </a:schemeClr>
-          </a:solidFill>
-          <a:prstDash val="solid"/>
-        </a:ln>
-        <a:effectLst/>
-      </dsp:spPr>
-      <dsp:style>
-        <a:lnRef idx="2">
-          <a:scrgbClr r="0" g="0" b="0"/>
-        </a:lnRef>
-        <a:fillRef idx="1">
-          <a:scrgbClr r="0" g="0" b="0"/>
-        </a:fillRef>
-        <a:effectRef idx="0">
-          <a:scrgbClr r="0" g="0" b="0"/>
-        </a:effectRef>
-        <a:fontRef idx="minor"/>
-      </dsp:style>
-      <dsp:txBody>
-        <a:bodyPr spcFirstLastPara="0" vert="horz" wrap="square" lIns="247650" tIns="123825" rIns="247650" bIns="123825" numCol="1" spcCol="1270" anchor="ctr" anchorCtr="0">
-          <a:noAutofit/>
-        </a:bodyPr>
-        <a:lstStyle/>
-        <a:p>
-          <a:pPr marL="114300" lvl="1" indent="-114300" algn="just" defTabSz="577850">
-            <a:lnSpc>
-              <a:spcPct val="90000"/>
-            </a:lnSpc>
-            <a:spcBef>
-              <a:spcPct val="0"/>
-            </a:spcBef>
-            <a:spcAft>
-              <a:spcPct val="15000"/>
-            </a:spcAft>
-            <a:buChar char="••"/>
-          </a:pPr>
-          <a:r>
-            <a:rPr lang="es-ES" altLang="es-PE" sz="1300" kern="1200" dirty="0" smtClean="0">
-              <a:solidFill>
-                <a:schemeClr val="tx1"/>
-              </a:solidFill>
-              <a:latin typeface="+mj-lt"/>
-            </a:rPr>
-            <a:t>Define, diseña y administra el proceso de Gestión de la configuración.</a:t>
-          </a:r>
-          <a:endParaRPr lang="es-PE" sz="1300" kern="1200" dirty="0">
-            <a:solidFill>
-              <a:schemeClr val="tx1"/>
-            </a:solidFill>
-            <a:latin typeface="+mj-lt"/>
-          </a:endParaRPr>
-        </a:p>
-        <a:p>
-          <a:pPr marL="114300" lvl="1" indent="-114300" algn="just" defTabSz="577850">
-            <a:lnSpc>
-              <a:spcPct val="90000"/>
-            </a:lnSpc>
-            <a:spcBef>
-              <a:spcPct val="0"/>
-            </a:spcBef>
-            <a:spcAft>
-              <a:spcPct val="15000"/>
-            </a:spcAft>
-            <a:buChar char="••"/>
-          </a:pPr>
-          <a:r>
-            <a:rPr lang="es-ES" altLang="es-PE" sz="1300" kern="1200" dirty="0" smtClean="0">
-              <a:solidFill>
-                <a:schemeClr val="tx1"/>
-              </a:solidFill>
-              <a:latin typeface="+mj-lt"/>
-            </a:rPr>
-            <a:t>Realiza el seguimiento de las tareas detalladas en el Plan de Proyecto.</a:t>
-          </a:r>
-          <a:endParaRPr lang="es-ES" altLang="es-PE" sz="1300" kern="1200" dirty="0">
-            <a:solidFill>
-              <a:schemeClr val="tx1"/>
-            </a:solidFill>
-            <a:latin typeface="+mj-lt"/>
-          </a:endParaRPr>
-        </a:p>
-        <a:p>
-          <a:pPr marL="114300" lvl="1" indent="-114300" algn="just" defTabSz="577850">
-            <a:lnSpc>
-              <a:spcPct val="90000"/>
-            </a:lnSpc>
-            <a:spcBef>
-              <a:spcPct val="0"/>
-            </a:spcBef>
-            <a:spcAft>
-              <a:spcPct val="15000"/>
-            </a:spcAft>
-            <a:buChar char="••"/>
-          </a:pPr>
-          <a:r>
-            <a:rPr lang="es-ES" altLang="es-PE" sz="1300" kern="1200" dirty="0" smtClean="0">
-              <a:solidFill>
-                <a:schemeClr val="tx1"/>
-              </a:solidFill>
-              <a:latin typeface="+mj-lt"/>
-            </a:rPr>
-            <a:t>Mantiene y preserva los </a:t>
-          </a:r>
-          <a:r>
-            <a:rPr lang="es-ES" altLang="es-PE" sz="1300" kern="1200" dirty="0" err="1" smtClean="0">
-              <a:solidFill>
-                <a:schemeClr val="tx1"/>
-              </a:solidFill>
-              <a:latin typeface="+mj-lt"/>
-            </a:rPr>
-            <a:t>Baselines</a:t>
-          </a:r>
-          <a:r>
-            <a:rPr lang="es-ES" altLang="es-PE" sz="1300" kern="1200" dirty="0" smtClean="0">
-              <a:solidFill>
-                <a:schemeClr val="tx1"/>
-              </a:solidFill>
-              <a:latin typeface="+mj-lt"/>
-            </a:rPr>
-            <a:t>.</a:t>
-          </a:r>
-          <a:endParaRPr lang="es-ES" altLang="es-PE" sz="1300" kern="1200" dirty="0">
-            <a:solidFill>
-              <a:schemeClr val="tx1"/>
-            </a:solidFill>
-            <a:latin typeface="+mj-lt"/>
-          </a:endParaRPr>
-        </a:p>
-        <a:p>
-          <a:pPr marL="114300" lvl="1" indent="-114300" algn="just" defTabSz="577850">
-            <a:lnSpc>
-              <a:spcPct val="90000"/>
-            </a:lnSpc>
-            <a:spcBef>
-              <a:spcPct val="0"/>
-            </a:spcBef>
-            <a:spcAft>
-              <a:spcPct val="15000"/>
-            </a:spcAft>
-            <a:buChar char="••"/>
-          </a:pPr>
-          <a:r>
-            <a:rPr lang="es-ES" altLang="es-PE" sz="1300" kern="1200" dirty="0" smtClean="0">
-              <a:solidFill>
-                <a:schemeClr val="tx1"/>
-              </a:solidFill>
-              <a:latin typeface="+mj-lt"/>
-            </a:rPr>
-            <a:t>Asegura y garantiza la disponibilidad de la información almacenada en el repositorio.</a:t>
-          </a:r>
-          <a:endParaRPr lang="es-ES" altLang="es-PE" sz="1300" kern="1200" dirty="0">
-            <a:solidFill>
-              <a:schemeClr val="tx1"/>
-            </a:solidFill>
-            <a:latin typeface="+mj-lt"/>
-          </a:endParaRPr>
-        </a:p>
-        <a:p>
-          <a:pPr marL="114300" lvl="1" indent="-114300" algn="just" defTabSz="577850">
-            <a:lnSpc>
-              <a:spcPct val="90000"/>
-            </a:lnSpc>
-            <a:spcBef>
-              <a:spcPct val="0"/>
-            </a:spcBef>
-            <a:spcAft>
-              <a:spcPct val="15000"/>
-            </a:spcAft>
-            <a:buChar char="••"/>
-          </a:pPr>
-          <a:r>
-            <a:rPr lang="es-ES" altLang="es-PE" sz="1300" kern="1200" dirty="0" smtClean="0">
-              <a:solidFill>
-                <a:schemeClr val="tx1"/>
-              </a:solidFill>
-              <a:latin typeface="+mj-lt"/>
-            </a:rPr>
-            <a:t>Encargado de actividades de versionamiento de los documentos a su cargo, de acuerdo a los estándares establecidos.</a:t>
-          </a:r>
-          <a:endParaRPr lang="es-ES" altLang="es-PE" sz="1300" kern="1200" dirty="0">
-            <a:solidFill>
-              <a:schemeClr val="tx1"/>
-            </a:solidFill>
-            <a:latin typeface="+mj-lt"/>
-          </a:endParaRPr>
-        </a:p>
-      </dsp:txBody>
-      <dsp:txXfrm rot="-5400000">
-        <a:off x="1696364" y="215465"/>
-        <a:ext cx="6860523" cy="1503401"/>
-      </dsp:txXfrm>
-    </dsp:sp>
-    <dsp:sp modelId="{8CC325B9-FE1B-4789-9E50-400E884AD525}">
-      <dsp:nvSpPr>
-        <dsp:cNvPr id="0" name=""/>
-        <dsp:cNvSpPr/>
-      </dsp:nvSpPr>
-      <dsp:spPr>
-        <a:xfrm>
-          <a:off x="765" y="1638"/>
-          <a:ext cx="1695599" cy="1931051"/>
-        </a:xfrm>
-        <a:prstGeom prst="roundRect">
-          <a:avLst/>
-        </a:prstGeom>
-        <a:solidFill>
-          <a:schemeClr val="dk2">
-            <a:hueOff val="0"/>
-            <a:satOff val="0"/>
-            <a:lumOff val="0"/>
-            <a:alphaOff val="0"/>
-          </a:schemeClr>
-        </a:solidFill>
-        <a:ln w="28575" cap="flat" cmpd="sng" algn="ctr">
-          <a:solidFill>
-            <a:schemeClr val="lt2">
-              <a:hueOff val="0"/>
-              <a:satOff val="0"/>
-              <a:lumOff val="0"/>
-              <a:alphaOff val="0"/>
-            </a:schemeClr>
-          </a:solidFill>
-          <a:prstDash val="solid"/>
-        </a:ln>
-        <a:effectLst/>
-      </dsp:spPr>
-      <dsp:style>
-        <a:lnRef idx="2">
-          <a:scrgbClr r="0" g="0" b="0"/>
-        </a:lnRef>
-        <a:fillRef idx="1">
-          <a:scrgbClr r="0" g="0" b="0"/>
-        </a:fillRef>
-        <a:effectRef idx="0">
-          <a:scrgbClr r="0" g="0" b="0"/>
-        </a:effectRef>
-        <a:fontRef idx="minor">
-          <a:schemeClr val="lt1"/>
-        </a:fontRef>
-      </dsp:style>
-      <dsp:txBody>
-        <a:bodyPr spcFirstLastPara="0" vert="horz" wrap="square" lIns="60960" tIns="30480" rIns="60960" bIns="30480" numCol="1" spcCol="1270" anchor="ctr" anchorCtr="0">
-          <a:noAutofit/>
-        </a:bodyPr>
-        <a:lstStyle/>
-        <a:p>
-          <a:pPr lvl="0" algn="ctr" defTabSz="711200">
-            <a:lnSpc>
-              <a:spcPct val="90000"/>
-            </a:lnSpc>
-            <a:spcBef>
-              <a:spcPct val="0"/>
-            </a:spcBef>
-            <a:spcAft>
-              <a:spcPct val="35000"/>
-            </a:spcAft>
-          </a:pPr>
-          <a:r>
-            <a:rPr lang="es-ES" sz="1600" b="1" kern="1200" dirty="0" smtClean="0">
-              <a:effectLst>
-                <a:outerShdw blurRad="38100" dist="38100" dir="2700000" algn="tl">
-                  <a:srgbClr val="000000">
-                    <a:alpha val="43137"/>
-                  </a:srgbClr>
-                </a:outerShdw>
-              </a:effectLst>
-            </a:rPr>
-            <a:t>Gestor de la Configuración</a:t>
-          </a:r>
-        </a:p>
-        <a:p>
-          <a:pPr lvl="0" algn="ctr" defTabSz="711200">
-            <a:lnSpc>
-              <a:spcPct val="90000"/>
-            </a:lnSpc>
-            <a:spcBef>
-              <a:spcPct val="0"/>
-            </a:spcBef>
-            <a:spcAft>
-              <a:spcPct val="35000"/>
-            </a:spcAft>
-          </a:pPr>
-          <a:endParaRPr lang="es-ES" sz="1600" b="1" kern="1200" dirty="0" smtClean="0">
-            <a:effectLst>
-              <a:outerShdw blurRad="38100" dist="38100" dir="2700000" algn="tl">
-                <a:srgbClr val="000000">
-                  <a:alpha val="43137"/>
-                </a:srgbClr>
-              </a:outerShdw>
-            </a:effectLst>
-          </a:endParaRPr>
-        </a:p>
-        <a:p>
-          <a:pPr lvl="0" algn="ctr" defTabSz="711200">
-            <a:lnSpc>
-              <a:spcPct val="90000"/>
-            </a:lnSpc>
-            <a:spcBef>
-              <a:spcPct val="0"/>
-            </a:spcBef>
-            <a:spcAft>
-              <a:spcPct val="35000"/>
-            </a:spcAft>
-          </a:pPr>
-          <a:r>
-            <a:rPr lang="es-ES" sz="1600" b="1" kern="1200" dirty="0" smtClean="0">
-              <a:effectLst>
-                <a:outerShdw blurRad="38100" dist="38100" dir="2700000" algn="tl">
-                  <a:srgbClr val="000000">
-                    <a:alpha val="43137"/>
-                  </a:srgbClr>
-                </a:outerShdw>
-              </a:effectLst>
-            </a:rPr>
-            <a:t>EJR-SOFT</a:t>
-          </a:r>
-          <a:endParaRPr lang="es-PE" sz="1600" b="1" kern="1200" dirty="0">
-            <a:effectLst>
-              <a:outerShdw blurRad="38100" dist="38100" dir="2700000" algn="tl">
-                <a:srgbClr val="000000">
-                  <a:alpha val="43137"/>
-                </a:srgbClr>
-              </a:outerShdw>
-            </a:effectLst>
-          </a:endParaRPr>
-        </a:p>
-      </dsp:txBody>
-      <dsp:txXfrm>
-        <a:off x="83537" y="84410"/>
-        <a:ext cx="1530055" cy="1765507"/>
-      </dsp:txXfrm>
-    </dsp:sp>
-    <dsp:sp modelId="{90FF61B1-8C9B-462F-B4E1-EA95A07D6F86}">
-      <dsp:nvSpPr>
-        <dsp:cNvPr id="0" name=""/>
-        <dsp:cNvSpPr/>
-      </dsp:nvSpPr>
-      <dsp:spPr>
-        <a:xfrm rot="5400000">
-          <a:off x="4490622" y="-604732"/>
-          <a:ext cx="1355310" cy="6943833"/>
-        </a:xfrm>
-        <a:prstGeom prst="round2SameRect">
-          <a:avLst/>
-        </a:prstGeom>
-        <a:solidFill>
-          <a:schemeClr val="dk2">
-            <a:alpha val="90000"/>
-            <a:tint val="40000"/>
-            <a:hueOff val="0"/>
-            <a:satOff val="0"/>
-            <a:lumOff val="0"/>
-            <a:alphaOff val="0"/>
-          </a:schemeClr>
-        </a:solidFill>
-        <a:ln w="28575" cap="flat" cmpd="sng" algn="ctr">
-          <a:solidFill>
-            <a:schemeClr val="dk2">
-              <a:alpha val="90000"/>
-              <a:tint val="40000"/>
-              <a:hueOff val="0"/>
-              <a:satOff val="0"/>
-              <a:lumOff val="0"/>
-              <a:alphaOff val="0"/>
-            </a:schemeClr>
-          </a:solidFill>
-          <a:prstDash val="solid"/>
-        </a:ln>
-        <a:effectLst/>
-      </dsp:spPr>
-      <dsp:style>
-        <a:lnRef idx="2">
-          <a:scrgbClr r="0" g="0" b="0"/>
-        </a:lnRef>
-        <a:fillRef idx="1">
-          <a:scrgbClr r="0" g="0" b="0"/>
-        </a:fillRef>
-        <a:effectRef idx="0">
-          <a:scrgbClr r="0" g="0" b="0"/>
-        </a:effectRef>
-        <a:fontRef idx="minor"/>
-      </dsp:style>
-      <dsp:txBody>
-        <a:bodyPr spcFirstLastPara="0" vert="horz" wrap="square" lIns="247650" tIns="123825" rIns="247650" bIns="123825" numCol="1" spcCol="1270" anchor="ctr" anchorCtr="0">
-          <a:noAutofit/>
-        </a:bodyPr>
-        <a:lstStyle/>
-        <a:p>
-          <a:pPr marL="0" lvl="1" indent="0" algn="just" defTabSz="577850">
-            <a:lnSpc>
-              <a:spcPct val="90000"/>
-            </a:lnSpc>
-            <a:spcBef>
-              <a:spcPct val="0"/>
-            </a:spcBef>
-            <a:spcAft>
-              <a:spcPct val="15000"/>
-            </a:spcAft>
-            <a:buChar char="••"/>
-          </a:pPr>
-          <a:r>
-            <a:rPr lang="es-MX" sz="1300" kern="1200" dirty="0" smtClean="0">
-              <a:solidFill>
-                <a:schemeClr val="tx1"/>
-              </a:solidFill>
-              <a:latin typeface="+mj-lt"/>
-            </a:rPr>
-            <a:t>Encargado de las actividades de versionamiento de los documentos de análisis, diseño y control interno (cronogramas y actas de reunión), de acuerdo a los estándares establecidos.</a:t>
-          </a:r>
-          <a:endParaRPr lang="es-PE" sz="1300" kern="1200" dirty="0">
-            <a:solidFill>
-              <a:schemeClr val="tx1"/>
-            </a:solidFill>
-            <a:latin typeface="+mj-lt"/>
-          </a:endParaRPr>
-        </a:p>
-        <a:p>
-          <a:pPr marL="0" lvl="1" indent="0" algn="just" defTabSz="577850">
-            <a:lnSpc>
-              <a:spcPct val="90000"/>
-            </a:lnSpc>
-            <a:spcBef>
-              <a:spcPct val="0"/>
-            </a:spcBef>
-            <a:spcAft>
-              <a:spcPct val="15000"/>
-            </a:spcAft>
-            <a:buChar char="••"/>
-          </a:pPr>
-          <a:r>
-            <a:rPr lang="es-MX" sz="1300" kern="1200" dirty="0" smtClean="0">
-              <a:solidFill>
-                <a:schemeClr val="tx1"/>
-              </a:solidFill>
-              <a:latin typeface="+mj-lt"/>
-            </a:rPr>
-            <a:t>Revisará que se mantenga los estándares de nomenclatura y versionamiento de los entregables.</a:t>
-          </a:r>
-          <a:endParaRPr lang="es-PE" sz="1300" kern="1200" dirty="0">
-            <a:solidFill>
-              <a:schemeClr val="tx1"/>
-            </a:solidFill>
-            <a:latin typeface="+mj-lt"/>
-          </a:endParaRPr>
-        </a:p>
-        <a:p>
-          <a:pPr marL="0" lvl="1" indent="0" algn="just" defTabSz="577850">
-            <a:lnSpc>
-              <a:spcPct val="90000"/>
-            </a:lnSpc>
-            <a:spcBef>
-              <a:spcPct val="0"/>
-            </a:spcBef>
-            <a:spcAft>
-              <a:spcPct val="15000"/>
-            </a:spcAft>
-            <a:buChar char="••"/>
-          </a:pPr>
-          <a:r>
-            <a:rPr lang="es-ES" altLang="es-PE" sz="1300" kern="1200" dirty="0" smtClean="0">
-              <a:solidFill>
-                <a:schemeClr val="tx1"/>
-              </a:solidFill>
-              <a:latin typeface="+mj-lt"/>
-            </a:rPr>
-            <a:t>Garantiza la sostenibilidad del proceso de gestión de la configuración</a:t>
-          </a:r>
-          <a:endParaRPr lang="es-PE" sz="1300" kern="1200" dirty="0">
-            <a:solidFill>
-              <a:schemeClr val="tx1"/>
-            </a:solidFill>
-            <a:latin typeface="+mj-lt"/>
-          </a:endParaRPr>
-        </a:p>
-      </dsp:txBody>
-      <dsp:txXfrm rot="-5400000">
-        <a:off x="1696361" y="2255690"/>
-        <a:ext cx="6877672" cy="1222988"/>
-      </dsp:txXfrm>
-    </dsp:sp>
-    <dsp:sp modelId="{26EEAA25-729A-4075-87DC-0DA13F9B7FA1}">
-      <dsp:nvSpPr>
-        <dsp:cNvPr id="0" name=""/>
-        <dsp:cNvSpPr/>
-      </dsp:nvSpPr>
-      <dsp:spPr>
-        <a:xfrm>
-          <a:off x="765" y="2063135"/>
-          <a:ext cx="1695596" cy="1608096"/>
-        </a:xfrm>
-        <a:prstGeom prst="roundRect">
-          <a:avLst/>
-        </a:prstGeom>
-        <a:solidFill>
-          <a:schemeClr val="dk2">
-            <a:hueOff val="0"/>
-            <a:satOff val="0"/>
-            <a:lumOff val="0"/>
-            <a:alphaOff val="0"/>
-          </a:schemeClr>
-        </a:solidFill>
-        <a:ln w="28575" cap="flat" cmpd="sng" algn="ctr">
-          <a:solidFill>
-            <a:schemeClr val="lt2">
-              <a:hueOff val="0"/>
-              <a:satOff val="0"/>
-              <a:lumOff val="0"/>
-              <a:alphaOff val="0"/>
-            </a:schemeClr>
-          </a:solidFill>
-          <a:prstDash val="solid"/>
-        </a:ln>
-        <a:effectLst/>
-      </dsp:spPr>
-      <dsp:style>
-        <a:lnRef idx="2">
-          <a:scrgbClr r="0" g="0" b="0"/>
-        </a:lnRef>
-        <a:fillRef idx="1">
-          <a:scrgbClr r="0" g="0" b="0"/>
-        </a:fillRef>
-        <a:effectRef idx="0">
-          <a:scrgbClr r="0" g="0" b="0"/>
-        </a:effectRef>
-        <a:fontRef idx="minor">
-          <a:schemeClr val="lt1"/>
-        </a:fontRef>
-      </dsp:style>
-      <dsp:txBody>
-        <a:bodyPr spcFirstLastPara="0" vert="horz" wrap="square" lIns="60960" tIns="30480" rIns="60960" bIns="30480" numCol="1" spcCol="1270" anchor="ctr" anchorCtr="0">
-          <a:noAutofit/>
-        </a:bodyPr>
-        <a:lstStyle/>
-        <a:p>
-          <a:pPr lvl="0" algn="ctr" defTabSz="711200">
-            <a:lnSpc>
-              <a:spcPct val="90000"/>
-            </a:lnSpc>
-            <a:spcBef>
-              <a:spcPct val="0"/>
-            </a:spcBef>
-            <a:spcAft>
-              <a:spcPct val="35000"/>
-            </a:spcAft>
-          </a:pPr>
-          <a:r>
-            <a:rPr lang="es-ES" sz="1600" b="1" kern="1200" dirty="0" smtClean="0">
-              <a:effectLst>
-                <a:outerShdw blurRad="38100" dist="38100" dir="2700000" algn="tl">
-                  <a:srgbClr val="000000">
-                    <a:alpha val="43137"/>
-                  </a:srgbClr>
-                </a:outerShdw>
-              </a:effectLst>
-            </a:rPr>
-            <a:t>Jefe de Proyecto</a:t>
-          </a:r>
-        </a:p>
-        <a:p>
-          <a:pPr lvl="0" algn="ctr" defTabSz="711200">
-            <a:lnSpc>
-              <a:spcPct val="90000"/>
-            </a:lnSpc>
-            <a:spcBef>
-              <a:spcPct val="0"/>
-            </a:spcBef>
-            <a:spcAft>
-              <a:spcPct val="35000"/>
-            </a:spcAft>
-          </a:pPr>
-          <a:r>
-            <a:rPr lang="es-ES" sz="1600" b="1" kern="1200" dirty="0" smtClean="0">
-              <a:effectLst>
-                <a:outerShdw blurRad="38100" dist="38100" dir="2700000" algn="tl">
-                  <a:srgbClr val="000000">
-                    <a:alpha val="43137"/>
-                  </a:srgbClr>
-                </a:outerShdw>
-              </a:effectLst>
-            </a:rPr>
-            <a:t>EJR-SOFT</a:t>
-          </a:r>
-          <a:endParaRPr lang="es-PE" sz="1600" b="1" kern="1200" dirty="0">
-            <a:effectLst>
-              <a:outerShdw blurRad="38100" dist="38100" dir="2700000" algn="tl">
-                <a:srgbClr val="000000">
-                  <a:alpha val="43137"/>
-                </a:srgbClr>
-              </a:outerShdw>
-            </a:effectLst>
-          </a:endParaRPr>
-        </a:p>
-      </dsp:txBody>
-      <dsp:txXfrm>
-        <a:off x="79266" y="2141636"/>
-        <a:ext cx="1538594" cy="1451094"/>
-      </dsp:txXfrm>
-    </dsp:sp>
-    <dsp:sp modelId="{606E3E56-5C5B-4E6D-B3B5-731FAFDC0CDE}">
-      <dsp:nvSpPr>
-        <dsp:cNvPr id="0" name=""/>
-        <dsp:cNvSpPr/>
-      </dsp:nvSpPr>
-      <dsp:spPr>
-        <a:xfrm rot="5400000">
-          <a:off x="4787161" y="838042"/>
-          <a:ext cx="758290" cy="6939885"/>
-        </a:xfrm>
-        <a:prstGeom prst="round2SameRect">
-          <a:avLst/>
-        </a:prstGeom>
-        <a:solidFill>
-          <a:schemeClr val="dk2">
-            <a:alpha val="90000"/>
-            <a:tint val="40000"/>
-            <a:hueOff val="0"/>
-            <a:satOff val="0"/>
-            <a:lumOff val="0"/>
-            <a:alphaOff val="0"/>
-          </a:schemeClr>
-        </a:solidFill>
-        <a:ln w="28575" cap="flat" cmpd="sng" algn="ctr">
-          <a:solidFill>
-            <a:schemeClr val="dk2">
-              <a:alpha val="90000"/>
-              <a:tint val="40000"/>
-              <a:hueOff val="0"/>
-              <a:satOff val="0"/>
-              <a:lumOff val="0"/>
-              <a:alphaOff val="0"/>
-            </a:schemeClr>
-          </a:solidFill>
-          <a:prstDash val="solid"/>
-        </a:ln>
-        <a:effectLst/>
-      </dsp:spPr>
-      <dsp:style>
-        <a:lnRef idx="2">
-          <a:scrgbClr r="0" g="0" b="0"/>
-        </a:lnRef>
-        <a:fillRef idx="1">
-          <a:scrgbClr r="0" g="0" b="0"/>
-        </a:fillRef>
-        <a:effectRef idx="0">
-          <a:scrgbClr r="0" g="0" b="0"/>
-        </a:effectRef>
-        <a:fontRef idx="minor"/>
-      </dsp:style>
-      <dsp:txBody>
-        <a:bodyPr spcFirstLastPara="0" vert="horz" wrap="square" lIns="247650" tIns="123825" rIns="247650" bIns="123825" numCol="1" spcCol="1270" anchor="ctr" anchorCtr="0">
-          <a:noAutofit/>
-        </a:bodyPr>
-        <a:lstStyle/>
-        <a:p>
-          <a:pPr marL="114300" lvl="1" indent="-114300" algn="l" defTabSz="577850">
-            <a:lnSpc>
-              <a:spcPct val="90000"/>
-            </a:lnSpc>
-            <a:spcBef>
-              <a:spcPct val="0"/>
-            </a:spcBef>
-            <a:spcAft>
-              <a:spcPct val="15000"/>
-            </a:spcAft>
-            <a:buChar char="••"/>
-          </a:pPr>
-          <a:r>
-            <a:rPr lang="es-PE" sz="1300" kern="1200" dirty="0" smtClean="0">
-              <a:solidFill>
-                <a:schemeClr val="tx1"/>
-              </a:solidFill>
-              <a:latin typeface="+mj-lt"/>
-            </a:rPr>
-            <a:t>Encargado de las actividades de versionamiento y revisión de los documento, de acuerdo a los procedimientos establecidos y verificando que se cumplan los estándares con los que se trabaja en el proyecto.</a:t>
-          </a:r>
-          <a:endParaRPr lang="es-PE" sz="1300" kern="1200" dirty="0">
-            <a:solidFill>
-              <a:schemeClr val="tx1"/>
-            </a:solidFill>
-            <a:latin typeface="+mj-lt"/>
-          </a:endParaRPr>
-        </a:p>
-      </dsp:txBody>
-      <dsp:txXfrm rot="-5400000">
-        <a:off x="1696364" y="3965857"/>
-        <a:ext cx="6902868" cy="684256"/>
-      </dsp:txXfrm>
-    </dsp:sp>
-    <dsp:sp modelId="{4F1584CA-B33D-4DB0-9C34-1ECED7CFA1C5}">
-      <dsp:nvSpPr>
-        <dsp:cNvPr id="0" name=""/>
-        <dsp:cNvSpPr/>
-      </dsp:nvSpPr>
-      <dsp:spPr>
-        <a:xfrm>
-          <a:off x="0" y="3794267"/>
-          <a:ext cx="1695599" cy="1012616"/>
-        </a:xfrm>
-        <a:prstGeom prst="roundRect">
-          <a:avLst/>
-        </a:prstGeom>
-        <a:solidFill>
-          <a:schemeClr val="dk2">
-            <a:hueOff val="0"/>
-            <a:satOff val="0"/>
-            <a:lumOff val="0"/>
-            <a:alphaOff val="0"/>
-          </a:schemeClr>
-        </a:solidFill>
-        <a:ln w="28575" cap="flat" cmpd="sng" algn="ctr">
-          <a:solidFill>
-            <a:schemeClr val="lt2">
-              <a:hueOff val="0"/>
-              <a:satOff val="0"/>
-              <a:lumOff val="0"/>
-              <a:alphaOff val="0"/>
-            </a:schemeClr>
-          </a:solidFill>
-          <a:prstDash val="solid"/>
-        </a:ln>
-        <a:effectLst/>
-      </dsp:spPr>
-      <dsp:style>
-        <a:lnRef idx="2">
-          <a:scrgbClr r="0" g="0" b="0"/>
-        </a:lnRef>
-        <a:fillRef idx="1">
-          <a:scrgbClr r="0" g="0" b="0"/>
-        </a:fillRef>
-        <a:effectRef idx="0">
-          <a:scrgbClr r="0" g="0" b="0"/>
-        </a:effectRef>
-        <a:fontRef idx="minor">
-          <a:schemeClr val="lt1"/>
-        </a:fontRef>
-      </dsp:style>
-      <dsp:txBody>
-        <a:bodyPr spcFirstLastPara="0" vert="horz" wrap="square" lIns="60960" tIns="30480" rIns="60960" bIns="30480" numCol="1" spcCol="1270" anchor="ctr" anchorCtr="0">
-          <a:noAutofit/>
-        </a:bodyPr>
-        <a:lstStyle/>
-        <a:p>
-          <a:pPr lvl="0" algn="ctr" defTabSz="711200">
-            <a:lnSpc>
-              <a:spcPct val="90000"/>
-            </a:lnSpc>
-            <a:spcBef>
-              <a:spcPct val="0"/>
-            </a:spcBef>
-            <a:spcAft>
-              <a:spcPct val="35000"/>
-            </a:spcAft>
-          </a:pPr>
-          <a:r>
-            <a:rPr lang="es-ES" sz="1600" b="1" kern="1200" dirty="0" smtClean="0">
-              <a:effectLst>
-                <a:outerShdw blurRad="38100" dist="38100" dir="2700000" algn="tl">
-                  <a:srgbClr val="000000">
-                    <a:alpha val="43137"/>
-                  </a:srgbClr>
-                </a:outerShdw>
-              </a:effectLst>
-            </a:rPr>
-            <a:t>Analista de Calidad</a:t>
-          </a:r>
-        </a:p>
-        <a:p>
-          <a:pPr lvl="0" algn="ctr" defTabSz="711200">
-            <a:lnSpc>
-              <a:spcPct val="90000"/>
-            </a:lnSpc>
-            <a:spcBef>
-              <a:spcPct val="0"/>
-            </a:spcBef>
-            <a:spcAft>
-              <a:spcPct val="35000"/>
-            </a:spcAft>
-          </a:pPr>
-          <a:r>
-            <a:rPr lang="es-ES" sz="1600" b="1" kern="1200" dirty="0" smtClean="0">
-              <a:effectLst>
-                <a:outerShdw blurRad="38100" dist="38100" dir="2700000" algn="tl">
-                  <a:srgbClr val="000000">
-                    <a:alpha val="43137"/>
-                  </a:srgbClr>
-                </a:outerShdw>
-              </a:effectLst>
-            </a:rPr>
-            <a:t>EJR-SOFT</a:t>
-          </a:r>
-          <a:endParaRPr lang="es-PE" sz="1600" b="1" kern="1200" dirty="0">
-            <a:effectLst>
-              <a:outerShdw blurRad="38100" dist="38100" dir="2700000" algn="tl">
-                <a:srgbClr val="000000">
-                  <a:alpha val="43137"/>
-                </a:srgbClr>
-              </a:outerShdw>
-            </a:effectLst>
-          </a:endParaRPr>
-        </a:p>
-      </dsp:txBody>
-      <dsp:txXfrm>
-        <a:off x="49432" y="3843699"/>
-        <a:ext cx="1596735" cy="913752"/>
-      </dsp:txXfrm>
-    </dsp:sp>
-    <dsp:sp modelId="{50E57063-BAFE-4849-B27F-45AB6336F242}">
-      <dsp:nvSpPr>
-        <dsp:cNvPr id="0" name=""/>
-        <dsp:cNvSpPr/>
-      </dsp:nvSpPr>
-      <dsp:spPr>
-        <a:xfrm rot="5400000">
-          <a:off x="4717727" y="2014126"/>
-          <a:ext cx="895790" cy="6938539"/>
-        </a:xfrm>
-        <a:prstGeom prst="round2SameRect">
-          <a:avLst/>
-        </a:prstGeom>
-        <a:solidFill>
-          <a:schemeClr val="dk2">
-            <a:alpha val="90000"/>
-            <a:tint val="40000"/>
-            <a:hueOff val="0"/>
-            <a:satOff val="0"/>
-            <a:lumOff val="0"/>
-            <a:alphaOff val="0"/>
-          </a:schemeClr>
-        </a:solidFill>
-        <a:ln w="28575" cap="flat" cmpd="sng" algn="ctr">
-          <a:solidFill>
-            <a:schemeClr val="dk2">
-              <a:alpha val="90000"/>
-              <a:tint val="40000"/>
-              <a:hueOff val="0"/>
-              <a:satOff val="0"/>
-              <a:lumOff val="0"/>
-              <a:alphaOff val="0"/>
-            </a:schemeClr>
-          </a:solidFill>
-          <a:prstDash val="solid"/>
-        </a:ln>
-        <a:effectLst/>
-      </dsp:spPr>
-      <dsp:style>
-        <a:lnRef idx="2">
-          <a:scrgbClr r="0" g="0" b="0"/>
-        </a:lnRef>
-        <a:fillRef idx="1">
-          <a:scrgbClr r="0" g="0" b="0"/>
-        </a:fillRef>
-        <a:effectRef idx="0">
-          <a:scrgbClr r="0" g="0" b="0"/>
-        </a:effectRef>
-        <a:fontRef idx="minor"/>
-      </dsp:style>
-      <dsp:txBody>
-        <a:bodyPr spcFirstLastPara="0" vert="horz" wrap="square" lIns="247650" tIns="123825" rIns="247650" bIns="123825" numCol="1" spcCol="1270" anchor="ctr" anchorCtr="0">
-          <a:noAutofit/>
-        </a:bodyPr>
-        <a:lstStyle/>
-        <a:p>
-          <a:pPr marL="114300" lvl="1" indent="-114300" algn="l" defTabSz="577850">
-            <a:lnSpc>
-              <a:spcPct val="90000"/>
-            </a:lnSpc>
-            <a:spcBef>
-              <a:spcPct val="0"/>
-            </a:spcBef>
-            <a:spcAft>
-              <a:spcPct val="15000"/>
-            </a:spcAft>
-            <a:buChar char="••"/>
-          </a:pPr>
-          <a:r>
-            <a:rPr lang="es-MX" sz="1300" kern="1200" dirty="0" smtClean="0">
-              <a:latin typeface="+mj-lt"/>
-            </a:rPr>
-            <a:t>Encargado de las actividades de versionamiento de documentos de análisis, diseño y control interno de acuerdo a los estándares establecidos.</a:t>
-          </a:r>
-          <a:endParaRPr lang="es-PE" sz="1300" kern="1200" dirty="0">
-            <a:latin typeface="+mj-lt"/>
-          </a:endParaRPr>
-        </a:p>
-      </dsp:txBody>
-      <dsp:txXfrm rot="-5400000">
-        <a:off x="1696353" y="5079230"/>
-        <a:ext cx="6894810" cy="808332"/>
-      </dsp:txXfrm>
-    </dsp:sp>
-    <dsp:sp modelId="{0C172A3D-1747-485F-A12F-621E60BDAD9E}">
-      <dsp:nvSpPr>
-        <dsp:cNvPr id="0" name=""/>
-        <dsp:cNvSpPr/>
-      </dsp:nvSpPr>
-      <dsp:spPr>
-        <a:xfrm>
-          <a:off x="765" y="4944738"/>
-          <a:ext cx="1695587" cy="1077317"/>
-        </a:xfrm>
-        <a:prstGeom prst="roundRect">
-          <a:avLst/>
-        </a:prstGeom>
-        <a:solidFill>
-          <a:schemeClr val="dk2">
-            <a:hueOff val="0"/>
-            <a:satOff val="0"/>
-            <a:lumOff val="0"/>
-            <a:alphaOff val="0"/>
-          </a:schemeClr>
-        </a:solidFill>
-        <a:ln w="28575" cap="flat" cmpd="sng" algn="ctr">
-          <a:solidFill>
-            <a:schemeClr val="lt2">
-              <a:hueOff val="0"/>
-              <a:satOff val="0"/>
-              <a:lumOff val="0"/>
-              <a:alphaOff val="0"/>
-            </a:schemeClr>
-          </a:solidFill>
-          <a:prstDash val="solid"/>
-        </a:ln>
-        <a:effectLst/>
-      </dsp:spPr>
-      <dsp:style>
-        <a:lnRef idx="2">
-          <a:scrgbClr r="0" g="0" b="0"/>
-        </a:lnRef>
-        <a:fillRef idx="1">
-          <a:scrgbClr r="0" g="0" b="0"/>
-        </a:fillRef>
-        <a:effectRef idx="0">
-          <a:scrgbClr r="0" g="0" b="0"/>
-        </a:effectRef>
-        <a:fontRef idx="minor">
-          <a:schemeClr val="lt1"/>
-        </a:fontRef>
-      </dsp:style>
-      <dsp:txBody>
-        <a:bodyPr spcFirstLastPara="0" vert="horz" wrap="square" lIns="60960" tIns="30480" rIns="60960" bIns="30480" numCol="1" spcCol="1270" anchor="ctr" anchorCtr="0">
-          <a:noAutofit/>
-        </a:bodyPr>
-        <a:lstStyle/>
-        <a:p>
-          <a:pPr lvl="0" algn="ctr" defTabSz="711200">
-            <a:lnSpc>
-              <a:spcPct val="90000"/>
-            </a:lnSpc>
-            <a:spcBef>
-              <a:spcPct val="0"/>
-            </a:spcBef>
-            <a:spcAft>
-              <a:spcPct val="35000"/>
-            </a:spcAft>
-          </a:pPr>
-          <a:r>
-            <a:rPr lang="es-ES" sz="1600" b="1" kern="1200" dirty="0" smtClean="0">
-              <a:effectLst>
-                <a:outerShdw blurRad="38100" dist="38100" dir="2700000" algn="tl">
-                  <a:srgbClr val="000000">
-                    <a:alpha val="43137"/>
-                  </a:srgbClr>
-                </a:outerShdw>
-              </a:effectLst>
-            </a:rPr>
-            <a:t>Analista Funcional</a:t>
-          </a:r>
-        </a:p>
-        <a:p>
-          <a:pPr lvl="0" algn="ctr" defTabSz="711200">
-            <a:lnSpc>
-              <a:spcPct val="90000"/>
-            </a:lnSpc>
-            <a:spcBef>
-              <a:spcPct val="0"/>
-            </a:spcBef>
-            <a:spcAft>
-              <a:spcPct val="35000"/>
-            </a:spcAft>
-          </a:pPr>
-          <a:r>
-            <a:rPr lang="es-ES" sz="1600" b="1" kern="1200" dirty="0" smtClean="0">
-              <a:effectLst>
-                <a:outerShdw blurRad="38100" dist="38100" dir="2700000" algn="tl">
-                  <a:srgbClr val="000000">
-                    <a:alpha val="43137"/>
-                  </a:srgbClr>
-                </a:outerShdw>
-              </a:effectLst>
-            </a:rPr>
-            <a:t>EJR-SOFT</a:t>
-          </a:r>
-          <a:endParaRPr lang="es-PE" sz="1600" b="1" kern="1200" dirty="0">
-            <a:effectLst>
-              <a:outerShdw blurRad="38100" dist="38100" dir="2700000" algn="tl">
-                <a:srgbClr val="000000">
-                  <a:alpha val="43137"/>
-                </a:srgbClr>
-              </a:outerShdw>
-            </a:effectLst>
-          </a:endParaRPr>
-        </a:p>
-      </dsp:txBody>
-      <dsp:txXfrm>
-        <a:off x="53355" y="4997328"/>
-        <a:ext cx="1590407" cy="972137"/>
-      </dsp:txXfrm>
-    </dsp:sp>
   </dsp:spTree>
 </dsp:drawing>
 </file>
@@ -12585,42 +11545,42 @@
                 <a:gridCol w="208280">
                   <a:extLst>
                     <a:ext uri="{9D8B030D-6E8A-4147-A177-3AD203B41FA5}">
-                      <a16:colId xmlns:a16="http://schemas.microsoft.com/office/drawing/2014/main" val="20000"/>
+                      <a16:colId xmlns:a16="http://schemas.microsoft.com/office/drawing/2014/main" xmlns="" val="20000"/>
                     </a:ext>
                   </a:extLst>
                 </a:gridCol>
                 <a:gridCol w="1303888">
                   <a:extLst>
                     <a:ext uri="{9D8B030D-6E8A-4147-A177-3AD203B41FA5}">
-                      <a16:colId xmlns:a16="http://schemas.microsoft.com/office/drawing/2014/main" val="20001"/>
+                      <a16:colId xmlns:a16="http://schemas.microsoft.com/office/drawing/2014/main" xmlns="" val="20001"/>
                     </a:ext>
                   </a:extLst>
                 </a:gridCol>
                 <a:gridCol w="1296144">
                   <a:extLst>
                     <a:ext uri="{9D8B030D-6E8A-4147-A177-3AD203B41FA5}">
-                      <a16:colId xmlns:a16="http://schemas.microsoft.com/office/drawing/2014/main" val="20002"/>
+                      <a16:colId xmlns:a16="http://schemas.microsoft.com/office/drawing/2014/main" xmlns="" val="20002"/>
                     </a:ext>
                   </a:extLst>
                 </a:gridCol>
                 <a:gridCol w="2952328">
                   <a:extLst>
                     <a:ext uri="{9D8B030D-6E8A-4147-A177-3AD203B41FA5}">
-                      <a16:colId xmlns:a16="http://schemas.microsoft.com/office/drawing/2014/main" val="20003"/>
+                      <a16:colId xmlns:a16="http://schemas.microsoft.com/office/drawing/2014/main" xmlns="" val="20003"/>
                     </a:ext>
                   </a:extLst>
                 </a:gridCol>
                 <a:gridCol w="1872208">
                   <a:extLst>
                     <a:ext uri="{9D8B030D-6E8A-4147-A177-3AD203B41FA5}">
-                      <a16:colId xmlns:a16="http://schemas.microsoft.com/office/drawing/2014/main" val="20004"/>
+                      <a16:colId xmlns:a16="http://schemas.microsoft.com/office/drawing/2014/main" xmlns="" val="20004"/>
                     </a:ext>
                   </a:extLst>
                 </a:gridCol>
                 <a:gridCol w="1188155">
                   <a:extLst>
                     <a:ext uri="{9D8B030D-6E8A-4147-A177-3AD203B41FA5}">
-                      <a16:colId xmlns:a16="http://schemas.microsoft.com/office/drawing/2014/main" val="20005"/>
+                      <a16:colId xmlns:a16="http://schemas.microsoft.com/office/drawing/2014/main" xmlns="" val="20005"/>
                     </a:ext>
                   </a:extLst>
                 </a:gridCol>
@@ -12778,7 +11738,7 @@
                 </a:tc>
                 <a:extLst>
                   <a:ext uri="{0D108BD9-81ED-4DB2-BD59-A6C34878D82A}">
-                    <a16:rowId xmlns:a16="http://schemas.microsoft.com/office/drawing/2014/main" val="10000"/>
+                    <a16:rowId xmlns:a16="http://schemas.microsoft.com/office/drawing/2014/main" xmlns="" val="10000"/>
                   </a:ext>
                 </a:extLst>
               </a:tr>
@@ -13144,7 +12104,7 @@
                 </a:tc>
                 <a:extLst>
                   <a:ext uri="{0D108BD9-81ED-4DB2-BD59-A6C34878D82A}">
-                    <a16:rowId xmlns:a16="http://schemas.microsoft.com/office/drawing/2014/main" val="10001"/>
+                    <a16:rowId xmlns:a16="http://schemas.microsoft.com/office/drawing/2014/main" xmlns="" val="10001"/>
                   </a:ext>
                 </a:extLst>
               </a:tr>
@@ -13507,7 +12467,7 @@
                 </a:tc>
                 <a:extLst>
                   <a:ext uri="{0D108BD9-81ED-4DB2-BD59-A6C34878D82A}">
-                    <a16:rowId xmlns:a16="http://schemas.microsoft.com/office/drawing/2014/main" val="10002"/>
+                    <a16:rowId xmlns:a16="http://schemas.microsoft.com/office/drawing/2014/main" xmlns="" val="10002"/>
                   </a:ext>
                 </a:extLst>
               </a:tr>
@@ -16284,42 +15244,42 @@
                 <a:gridCol w="208280">
                   <a:extLst>
                     <a:ext uri="{9D8B030D-6E8A-4147-A177-3AD203B41FA5}">
-                      <a16:colId xmlns:a16="http://schemas.microsoft.com/office/drawing/2014/main" val="20000"/>
+                      <a16:colId xmlns:a16="http://schemas.microsoft.com/office/drawing/2014/main" xmlns="" val="20000"/>
                     </a:ext>
                   </a:extLst>
                 </a:gridCol>
                 <a:gridCol w="1303888">
                   <a:extLst>
                     <a:ext uri="{9D8B030D-6E8A-4147-A177-3AD203B41FA5}">
-                      <a16:colId xmlns:a16="http://schemas.microsoft.com/office/drawing/2014/main" val="20001"/>
+                      <a16:colId xmlns:a16="http://schemas.microsoft.com/office/drawing/2014/main" xmlns="" val="20001"/>
                     </a:ext>
                   </a:extLst>
                 </a:gridCol>
                 <a:gridCol w="1512168">
                   <a:extLst>
                     <a:ext uri="{9D8B030D-6E8A-4147-A177-3AD203B41FA5}">
-                      <a16:colId xmlns:a16="http://schemas.microsoft.com/office/drawing/2014/main" val="20002"/>
+                      <a16:colId xmlns:a16="http://schemas.microsoft.com/office/drawing/2014/main" xmlns="" val="20002"/>
                     </a:ext>
                   </a:extLst>
                 </a:gridCol>
                 <a:gridCol w="2808312">
                   <a:extLst>
                     <a:ext uri="{9D8B030D-6E8A-4147-A177-3AD203B41FA5}">
-                      <a16:colId xmlns:a16="http://schemas.microsoft.com/office/drawing/2014/main" val="20003"/>
+                      <a16:colId xmlns:a16="http://schemas.microsoft.com/office/drawing/2014/main" xmlns="" val="20003"/>
                     </a:ext>
                   </a:extLst>
                 </a:gridCol>
                 <a:gridCol w="1440160">
                   <a:extLst>
                     <a:ext uri="{9D8B030D-6E8A-4147-A177-3AD203B41FA5}">
-                      <a16:colId xmlns:a16="http://schemas.microsoft.com/office/drawing/2014/main" val="20004"/>
+                      <a16:colId xmlns:a16="http://schemas.microsoft.com/office/drawing/2014/main" xmlns="" val="20004"/>
                     </a:ext>
                   </a:extLst>
                 </a:gridCol>
                 <a:gridCol w="1542375">
                   <a:extLst>
                     <a:ext uri="{9D8B030D-6E8A-4147-A177-3AD203B41FA5}">
-                      <a16:colId xmlns:a16="http://schemas.microsoft.com/office/drawing/2014/main" val="20005"/>
+                      <a16:colId xmlns:a16="http://schemas.microsoft.com/office/drawing/2014/main" xmlns="" val="20005"/>
                     </a:ext>
                   </a:extLst>
                 </a:gridCol>
@@ -16477,7 +15437,7 @@
                 </a:tc>
                 <a:extLst>
                   <a:ext uri="{0D108BD9-81ED-4DB2-BD59-A6C34878D82A}">
-                    <a16:rowId xmlns:a16="http://schemas.microsoft.com/office/drawing/2014/main" val="10000"/>
+                    <a16:rowId xmlns:a16="http://schemas.microsoft.com/office/drawing/2014/main" xmlns="" val="10000"/>
                   </a:ext>
                 </a:extLst>
               </a:tr>
@@ -16838,7 +15798,7 @@
                 </a:tc>
                 <a:extLst>
                   <a:ext uri="{0D108BD9-81ED-4DB2-BD59-A6C34878D82A}">
-                    <a16:rowId xmlns:a16="http://schemas.microsoft.com/office/drawing/2014/main" val="10001"/>
+                    <a16:rowId xmlns:a16="http://schemas.microsoft.com/office/drawing/2014/main" xmlns="" val="10001"/>
                   </a:ext>
                 </a:extLst>
               </a:tr>
@@ -17129,7 +16089,7 @@
                 </a:tc>
                 <a:extLst>
                   <a:ext uri="{0D108BD9-81ED-4DB2-BD59-A6C34878D82A}">
-                    <a16:rowId xmlns:a16="http://schemas.microsoft.com/office/drawing/2014/main" val="10002"/>
+                    <a16:rowId xmlns:a16="http://schemas.microsoft.com/office/drawing/2014/main" xmlns="" val="10002"/>
                   </a:ext>
                 </a:extLst>
               </a:tr>
@@ -20699,42 +19659,42 @@
                 <a:gridCol w="216024">
                   <a:extLst>
                     <a:ext uri="{9D8B030D-6E8A-4147-A177-3AD203B41FA5}">
-                      <a16:colId xmlns:a16="http://schemas.microsoft.com/office/drawing/2014/main" val="20000"/>
+                      <a16:colId xmlns:a16="http://schemas.microsoft.com/office/drawing/2014/main" xmlns="" val="20000"/>
                     </a:ext>
                   </a:extLst>
                 </a:gridCol>
                 <a:gridCol w="1224136">
                   <a:extLst>
                     <a:ext uri="{9D8B030D-6E8A-4147-A177-3AD203B41FA5}">
-                      <a16:colId xmlns:a16="http://schemas.microsoft.com/office/drawing/2014/main" val="20001"/>
+                      <a16:colId xmlns:a16="http://schemas.microsoft.com/office/drawing/2014/main" xmlns="" val="20001"/>
                     </a:ext>
                   </a:extLst>
                 </a:gridCol>
                 <a:gridCol w="1368152">
                   <a:extLst>
                     <a:ext uri="{9D8B030D-6E8A-4147-A177-3AD203B41FA5}">
-                      <a16:colId xmlns:a16="http://schemas.microsoft.com/office/drawing/2014/main" val="20002"/>
+                      <a16:colId xmlns:a16="http://schemas.microsoft.com/office/drawing/2014/main" xmlns="" val="20002"/>
                     </a:ext>
                   </a:extLst>
                 </a:gridCol>
                 <a:gridCol w="2664296">
                   <a:extLst>
                     <a:ext uri="{9D8B030D-6E8A-4147-A177-3AD203B41FA5}">
-                      <a16:colId xmlns:a16="http://schemas.microsoft.com/office/drawing/2014/main" val="20003"/>
+                      <a16:colId xmlns:a16="http://schemas.microsoft.com/office/drawing/2014/main" xmlns="" val="20003"/>
                     </a:ext>
                   </a:extLst>
                 </a:gridCol>
                 <a:gridCol w="1800200">
                   <a:extLst>
                     <a:ext uri="{9D8B030D-6E8A-4147-A177-3AD203B41FA5}">
-                      <a16:colId xmlns:a16="http://schemas.microsoft.com/office/drawing/2014/main" val="20004"/>
+                      <a16:colId xmlns:a16="http://schemas.microsoft.com/office/drawing/2014/main" xmlns="" val="20004"/>
                     </a:ext>
                   </a:extLst>
                 </a:gridCol>
                 <a:gridCol w="1542375">
                   <a:extLst>
                     <a:ext uri="{9D8B030D-6E8A-4147-A177-3AD203B41FA5}">
-                      <a16:colId xmlns:a16="http://schemas.microsoft.com/office/drawing/2014/main" val="20005"/>
+                      <a16:colId xmlns:a16="http://schemas.microsoft.com/office/drawing/2014/main" xmlns="" val="20005"/>
                     </a:ext>
                   </a:extLst>
                 </a:gridCol>
@@ -20892,7 +19852,7 @@
                 </a:tc>
                 <a:extLst>
                   <a:ext uri="{0D108BD9-81ED-4DB2-BD59-A6C34878D82A}">
-                    <a16:rowId xmlns:a16="http://schemas.microsoft.com/office/drawing/2014/main" val="10000"/>
+                    <a16:rowId xmlns:a16="http://schemas.microsoft.com/office/drawing/2014/main" xmlns="" val="10000"/>
                   </a:ext>
                 </a:extLst>
               </a:tr>
@@ -21147,7 +20107,7 @@
                 </a:tc>
                 <a:extLst>
                   <a:ext uri="{0D108BD9-81ED-4DB2-BD59-A6C34878D82A}">
-                    <a16:rowId xmlns:a16="http://schemas.microsoft.com/office/drawing/2014/main" val="10001"/>
+                    <a16:rowId xmlns:a16="http://schemas.microsoft.com/office/drawing/2014/main" xmlns="" val="10001"/>
                   </a:ext>
                 </a:extLst>
               </a:tr>
@@ -21476,7 +20436,7 @@
                 </a:tc>
                 <a:extLst>
                   <a:ext uri="{0D108BD9-81ED-4DB2-BD59-A6C34878D82A}">
-                    <a16:rowId xmlns:a16="http://schemas.microsoft.com/office/drawing/2014/main" val="10002"/>
+                    <a16:rowId xmlns:a16="http://schemas.microsoft.com/office/drawing/2014/main" xmlns="" val="10002"/>
                   </a:ext>
                 </a:extLst>
               </a:tr>
@@ -21765,7 +20725,7 @@
                 </a:tc>
                 <a:extLst>
                   <a:ext uri="{0D108BD9-81ED-4DB2-BD59-A6C34878D82A}">
-                    <a16:rowId xmlns:a16="http://schemas.microsoft.com/office/drawing/2014/main" val="10003"/>
+                    <a16:rowId xmlns:a16="http://schemas.microsoft.com/office/drawing/2014/main" xmlns="" val="10003"/>
                   </a:ext>
                 </a:extLst>
               </a:tr>
@@ -22067,42 +21027,42 @@
                 <a:gridCol w="216024">
                   <a:extLst>
                     <a:ext uri="{9D8B030D-6E8A-4147-A177-3AD203B41FA5}">
-                      <a16:colId xmlns:a16="http://schemas.microsoft.com/office/drawing/2014/main" val="20000"/>
+                      <a16:colId xmlns:a16="http://schemas.microsoft.com/office/drawing/2014/main" xmlns="" val="20000"/>
                     </a:ext>
                   </a:extLst>
                 </a:gridCol>
                 <a:gridCol w="1224136">
                   <a:extLst>
                     <a:ext uri="{9D8B030D-6E8A-4147-A177-3AD203B41FA5}">
-                      <a16:colId xmlns:a16="http://schemas.microsoft.com/office/drawing/2014/main" val="20001"/>
+                      <a16:colId xmlns:a16="http://schemas.microsoft.com/office/drawing/2014/main" xmlns="" val="20001"/>
                     </a:ext>
                   </a:extLst>
                 </a:gridCol>
                 <a:gridCol w="1440160">
                   <a:extLst>
                     <a:ext uri="{9D8B030D-6E8A-4147-A177-3AD203B41FA5}">
-                      <a16:colId xmlns:a16="http://schemas.microsoft.com/office/drawing/2014/main" val="20002"/>
+                      <a16:colId xmlns:a16="http://schemas.microsoft.com/office/drawing/2014/main" xmlns="" val="20002"/>
                     </a:ext>
                   </a:extLst>
                 </a:gridCol>
                 <a:gridCol w="3024336">
                   <a:extLst>
                     <a:ext uri="{9D8B030D-6E8A-4147-A177-3AD203B41FA5}">
-                      <a16:colId xmlns:a16="http://schemas.microsoft.com/office/drawing/2014/main" val="20003"/>
+                      <a16:colId xmlns:a16="http://schemas.microsoft.com/office/drawing/2014/main" xmlns="" val="20003"/>
                     </a:ext>
                   </a:extLst>
                 </a:gridCol>
                 <a:gridCol w="1656184">
                   <a:extLst>
                     <a:ext uri="{9D8B030D-6E8A-4147-A177-3AD203B41FA5}">
-                      <a16:colId xmlns:a16="http://schemas.microsoft.com/office/drawing/2014/main" val="20004"/>
+                      <a16:colId xmlns:a16="http://schemas.microsoft.com/office/drawing/2014/main" xmlns="" val="20004"/>
                     </a:ext>
                   </a:extLst>
                 </a:gridCol>
                 <a:gridCol w="1254343">
                   <a:extLst>
                     <a:ext uri="{9D8B030D-6E8A-4147-A177-3AD203B41FA5}">
-                      <a16:colId xmlns:a16="http://schemas.microsoft.com/office/drawing/2014/main" val="20005"/>
+                      <a16:colId xmlns:a16="http://schemas.microsoft.com/office/drawing/2014/main" xmlns="" val="20005"/>
                     </a:ext>
                   </a:extLst>
                 </a:gridCol>
@@ -22260,7 +21220,7 @@
                 </a:tc>
                 <a:extLst>
                   <a:ext uri="{0D108BD9-81ED-4DB2-BD59-A6C34878D82A}">
-                    <a16:rowId xmlns:a16="http://schemas.microsoft.com/office/drawing/2014/main" val="10000"/>
+                    <a16:rowId xmlns:a16="http://schemas.microsoft.com/office/drawing/2014/main" xmlns="" val="10000"/>
                   </a:ext>
                 </a:extLst>
               </a:tr>
@@ -22531,7 +21491,7 @@
                 </a:tc>
                 <a:extLst>
                   <a:ext uri="{0D108BD9-81ED-4DB2-BD59-A6C34878D82A}">
-                    <a16:rowId xmlns:a16="http://schemas.microsoft.com/office/drawing/2014/main" val="10001"/>
+                    <a16:rowId xmlns:a16="http://schemas.microsoft.com/office/drawing/2014/main" xmlns="" val="10001"/>
                   </a:ext>
                 </a:extLst>
               </a:tr>
@@ -22831,7 +21791,7 @@
                 </a:tc>
                 <a:extLst>
                   <a:ext uri="{0D108BD9-81ED-4DB2-BD59-A6C34878D82A}">
-                    <a16:rowId xmlns:a16="http://schemas.microsoft.com/office/drawing/2014/main" val="10002"/>
+                    <a16:rowId xmlns:a16="http://schemas.microsoft.com/office/drawing/2014/main" xmlns="" val="10002"/>
                   </a:ext>
                 </a:extLst>
               </a:tr>
@@ -23094,7 +22054,7 @@
                 </a:tc>
                 <a:extLst>
                   <a:ext uri="{0D108BD9-81ED-4DB2-BD59-A6C34878D82A}">
-                    <a16:rowId xmlns:a16="http://schemas.microsoft.com/office/drawing/2014/main" val="10003"/>
+                    <a16:rowId xmlns:a16="http://schemas.microsoft.com/office/drawing/2014/main" xmlns="" val="10003"/>
                   </a:ext>
                 </a:extLst>
               </a:tr>
@@ -24147,28 +23107,28 @@
                 <a:gridCol w="376595">
                   <a:extLst>
                     <a:ext uri="{9D8B030D-6E8A-4147-A177-3AD203B41FA5}">
-                      <a16:colId xmlns:a16="http://schemas.microsoft.com/office/drawing/2014/main" val="20000"/>
+                      <a16:colId xmlns:a16="http://schemas.microsoft.com/office/drawing/2014/main" xmlns="" val="20000"/>
                     </a:ext>
                   </a:extLst>
                 </a:gridCol>
                 <a:gridCol w="3112625">
                   <a:extLst>
                     <a:ext uri="{9D8B030D-6E8A-4147-A177-3AD203B41FA5}">
-                      <a16:colId xmlns:a16="http://schemas.microsoft.com/office/drawing/2014/main" val="20001"/>
+                      <a16:colId xmlns:a16="http://schemas.microsoft.com/office/drawing/2014/main" xmlns="" val="20001"/>
                     </a:ext>
                   </a:extLst>
                 </a:gridCol>
                 <a:gridCol w="3318298">
                   <a:extLst>
                     <a:ext uri="{9D8B030D-6E8A-4147-A177-3AD203B41FA5}">
-                      <a16:colId xmlns:a16="http://schemas.microsoft.com/office/drawing/2014/main" val="20002"/>
+                      <a16:colId xmlns:a16="http://schemas.microsoft.com/office/drawing/2014/main" xmlns="" val="20002"/>
                     </a:ext>
                   </a:extLst>
                 </a:gridCol>
                 <a:gridCol w="1400681">
                   <a:extLst>
                     <a:ext uri="{9D8B030D-6E8A-4147-A177-3AD203B41FA5}">
-                      <a16:colId xmlns:a16="http://schemas.microsoft.com/office/drawing/2014/main" val="20003"/>
+                      <a16:colId xmlns:a16="http://schemas.microsoft.com/office/drawing/2014/main" xmlns="" val="20003"/>
                     </a:ext>
                   </a:extLst>
                 </a:gridCol>
@@ -24544,7 +23504,7 @@
                 </a:tc>
                 <a:extLst>
                   <a:ext uri="{0D108BD9-81ED-4DB2-BD59-A6C34878D82A}">
-                    <a16:rowId xmlns:a16="http://schemas.microsoft.com/office/drawing/2014/main" val="10000"/>
+                    <a16:rowId xmlns:a16="http://schemas.microsoft.com/office/drawing/2014/main" xmlns="" val="10000"/>
                   </a:ext>
                 </a:extLst>
               </a:tr>
@@ -24908,7 +23868,7 @@
                 </a:tc>
                 <a:extLst>
                   <a:ext uri="{0D108BD9-81ED-4DB2-BD59-A6C34878D82A}">
-                    <a16:rowId xmlns:a16="http://schemas.microsoft.com/office/drawing/2014/main" val="10001"/>
+                    <a16:rowId xmlns:a16="http://schemas.microsoft.com/office/drawing/2014/main" xmlns="" val="10001"/>
                   </a:ext>
                 </a:extLst>
               </a:tr>
@@ -25261,7 +24221,7 @@
                 </a:tc>
                 <a:extLst>
                   <a:ext uri="{0D108BD9-81ED-4DB2-BD59-A6C34878D82A}">
-                    <a16:rowId xmlns:a16="http://schemas.microsoft.com/office/drawing/2014/main" val="10002"/>
+                    <a16:rowId xmlns:a16="http://schemas.microsoft.com/office/drawing/2014/main" xmlns="" val="10002"/>
                   </a:ext>
                 </a:extLst>
               </a:tr>
@@ -25611,7 +24571,7 @@
                 </a:tc>
                 <a:extLst>
                   <a:ext uri="{0D108BD9-81ED-4DB2-BD59-A6C34878D82A}">
-                    <a16:rowId xmlns:a16="http://schemas.microsoft.com/office/drawing/2014/main" val="10003"/>
+                    <a16:rowId xmlns:a16="http://schemas.microsoft.com/office/drawing/2014/main" xmlns="" val="10003"/>
                   </a:ext>
                 </a:extLst>
               </a:tr>
@@ -25969,7 +24929,7 @@
           <p:nvPr>
             <p:extLst>
               <p:ext uri="{D42A27DB-BD31-4B8C-83A1-F6EECF244321}">
-                <p14:modId xmlns:p14="http://schemas.microsoft.com/office/powerpoint/2010/main" val="531697007"/>
+                <p14:modId xmlns:p14="http://schemas.microsoft.com/office/powerpoint/2010/main" val="414764270"/>
               </p:ext>
             </p:extLst>
           </p:nvPr>
@@ -25988,49 +24948,49 @@
                 <a:gridCol w="208280">
                   <a:extLst>
                     <a:ext uri="{9D8B030D-6E8A-4147-A177-3AD203B41FA5}">
-                      <a16:colId xmlns:a16="http://schemas.microsoft.com/office/drawing/2014/main" val="20000"/>
+                      <a16:colId xmlns:a16="http://schemas.microsoft.com/office/drawing/2014/main" xmlns="" val="20000"/>
                     </a:ext>
                   </a:extLst>
                 </a:gridCol>
                 <a:gridCol w="823239">
                   <a:extLst>
                     <a:ext uri="{9D8B030D-6E8A-4147-A177-3AD203B41FA5}">
-                      <a16:colId xmlns:a16="http://schemas.microsoft.com/office/drawing/2014/main" val="20001"/>
+                      <a16:colId xmlns:a16="http://schemas.microsoft.com/office/drawing/2014/main" xmlns="" val="20001"/>
                     </a:ext>
                   </a:extLst>
                 </a:gridCol>
                 <a:gridCol w="1224136">
                   <a:extLst>
                     <a:ext uri="{9D8B030D-6E8A-4147-A177-3AD203B41FA5}">
-                      <a16:colId xmlns:a16="http://schemas.microsoft.com/office/drawing/2014/main" val="20002"/>
+                      <a16:colId xmlns:a16="http://schemas.microsoft.com/office/drawing/2014/main" xmlns="" val="20002"/>
                     </a:ext>
                   </a:extLst>
                 </a:gridCol>
                 <a:gridCol w="1368152">
                   <a:extLst>
                     <a:ext uri="{9D8B030D-6E8A-4147-A177-3AD203B41FA5}">
-                      <a16:colId xmlns:a16="http://schemas.microsoft.com/office/drawing/2014/main" val="20003"/>
+                      <a16:colId xmlns:a16="http://schemas.microsoft.com/office/drawing/2014/main" xmlns="" val="20003"/>
                     </a:ext>
                   </a:extLst>
                 </a:gridCol>
                 <a:gridCol w="1368152">
                   <a:extLst>
                     <a:ext uri="{9D8B030D-6E8A-4147-A177-3AD203B41FA5}">
-                      <a16:colId xmlns:a16="http://schemas.microsoft.com/office/drawing/2014/main" val="20004"/>
+                      <a16:colId xmlns:a16="http://schemas.microsoft.com/office/drawing/2014/main" xmlns="" val="20004"/>
                     </a:ext>
                   </a:extLst>
                 </a:gridCol>
                 <a:gridCol w="1182851">
                   <a:extLst>
                     <a:ext uri="{9D8B030D-6E8A-4147-A177-3AD203B41FA5}">
-                      <a16:colId xmlns:a16="http://schemas.microsoft.com/office/drawing/2014/main" val="20005"/>
+                      <a16:colId xmlns:a16="http://schemas.microsoft.com/office/drawing/2014/main" xmlns="" val="20005"/>
                     </a:ext>
                   </a:extLst>
                 </a:gridCol>
                 <a:gridCol w="2527844">
                   <a:extLst>
                     <a:ext uri="{9D8B030D-6E8A-4147-A177-3AD203B41FA5}">
-                      <a16:colId xmlns:a16="http://schemas.microsoft.com/office/drawing/2014/main" val="20006"/>
+                      <a16:colId xmlns:a16="http://schemas.microsoft.com/office/drawing/2014/main" xmlns="" val="20006"/>
                     </a:ext>
                   </a:extLst>
                 </a:gridCol>
@@ -26219,7 +25179,7 @@
                 </a:tc>
                 <a:extLst>
                   <a:ext uri="{0D108BD9-81ED-4DB2-BD59-A6C34878D82A}">
-                    <a16:rowId xmlns:a16="http://schemas.microsoft.com/office/drawing/2014/main" val="10000"/>
+                    <a16:rowId xmlns:a16="http://schemas.microsoft.com/office/drawing/2014/main" xmlns="" val="10000"/>
                   </a:ext>
                 </a:extLst>
               </a:tr>
@@ -26455,14 +25415,6 @@
                         </a:rPr>
                         <a:t>REVISADO</a:t>
                       </a:r>
-                      <a:endParaRPr lang="es-ES" sz="1200" b="1" kern="1200" dirty="0" smtClean="0">
-                        <a:solidFill>
-                          <a:schemeClr val="dk1"/>
-                        </a:solidFill>
-                        <a:latin typeface="+mj-lt"/>
-                        <a:ea typeface="Verdana" panose="020B0604030504040204" pitchFamily="34" charset="0"/>
-                        <a:cs typeface="Verdana" panose="020B0604030504040204" pitchFamily="34" charset="0"/>
-                      </a:endParaRPr>
                     </a:p>
                   </a:txBody>
                   <a:tcPr marT="45702" marB="45702" anchor="ctr" horzOverflow="overflow"/>
@@ -26524,7 +25476,7 @@
                 </a:tc>
                 <a:extLst>
                   <a:ext uri="{0D108BD9-81ED-4DB2-BD59-A6C34878D82A}">
-                    <a16:rowId xmlns:a16="http://schemas.microsoft.com/office/drawing/2014/main" val="10001"/>
+                    <a16:rowId xmlns:a16="http://schemas.microsoft.com/office/drawing/2014/main" xmlns="" val="10001"/>
                   </a:ext>
                 </a:extLst>
               </a:tr>
@@ -26595,8 +25547,16 @@
                           <a:ea typeface="Verdana" panose="020B0604030504040204" pitchFamily="34" charset="0"/>
                           <a:cs typeface="Verdana" panose="020B0604030504040204" pitchFamily="34" charset="0"/>
                         </a:rPr>
-                        <a:t>1.0</a:t>
+                        <a:t>1.1</a:t>
                       </a:r>
+                      <a:endParaRPr lang="es-ES" sz="1200" b="1" kern="1200" dirty="0" smtClean="0">
+                        <a:solidFill>
+                          <a:schemeClr val="dk1"/>
+                        </a:solidFill>
+                        <a:latin typeface="+mj-lt"/>
+                        <a:ea typeface="Verdana" panose="020B0604030504040204" pitchFamily="34" charset="0"/>
+                        <a:cs typeface="Verdana" panose="020B0604030504040204" pitchFamily="34" charset="0"/>
+                      </a:endParaRPr>
                     </a:p>
                   </a:txBody>
                   <a:tcPr marT="45702" marB="45702" anchor="ctr" horzOverflow="overflow"/>
@@ -26633,14 +25593,6 @@
                         </a:rPr>
                         <a:t>19/11/2015</a:t>
                       </a:r>
-                      <a:endParaRPr lang="es-ES" sz="1200" b="1" kern="1200" dirty="0" smtClean="0">
-                        <a:solidFill>
-                          <a:schemeClr val="dk1"/>
-                        </a:solidFill>
-                        <a:latin typeface="+mj-lt"/>
-                        <a:ea typeface="Verdana" panose="020B0604030504040204" pitchFamily="34" charset="0"/>
-                        <a:cs typeface="Verdana" panose="020B0604030504040204" pitchFamily="34" charset="0"/>
-                      </a:endParaRPr>
                     </a:p>
                   </a:txBody>
                   <a:tcPr marT="45702" marB="45702" anchor="ctr" horzOverflow="overflow"/>
@@ -26837,7 +25789,7 @@
                 </a:tc>
                 <a:extLst>
                   <a:ext uri="{0D108BD9-81ED-4DB2-BD59-A6C34878D82A}">
-                    <a16:rowId xmlns:a16="http://schemas.microsoft.com/office/drawing/2014/main" val="10002"/>
+                    <a16:rowId xmlns:a16="http://schemas.microsoft.com/office/drawing/2014/main" xmlns="" val="10002"/>
                   </a:ext>
                 </a:extLst>
               </a:tr>
@@ -27078,7 +26030,7 @@
                 </a:tc>
                 <a:extLst>
                   <a:ext uri="{0D108BD9-81ED-4DB2-BD59-A6C34878D82A}">
-                    <a16:rowId xmlns:a16="http://schemas.microsoft.com/office/drawing/2014/main" val="10003"/>
+                    <a16:rowId xmlns:a16="http://schemas.microsoft.com/office/drawing/2014/main" xmlns="" val="10003"/>
                   </a:ext>
                 </a:extLst>
               </a:tr>
@@ -27319,7 +26271,7 @@
                 </a:tc>
                 <a:extLst>
                   <a:ext uri="{0D108BD9-81ED-4DB2-BD59-A6C34878D82A}">
-                    <a16:rowId xmlns:a16="http://schemas.microsoft.com/office/drawing/2014/main" val="10004"/>
+                    <a16:rowId xmlns:a16="http://schemas.microsoft.com/office/drawing/2014/main" xmlns="" val="10004"/>
                   </a:ext>
                 </a:extLst>
               </a:tr>
@@ -27560,7 +26512,7 @@
                 </a:tc>
                 <a:extLst>
                   <a:ext uri="{0D108BD9-81ED-4DB2-BD59-A6C34878D82A}">
-                    <a16:rowId xmlns:a16="http://schemas.microsoft.com/office/drawing/2014/main" val="10005"/>
+                    <a16:rowId xmlns:a16="http://schemas.microsoft.com/office/drawing/2014/main" xmlns="" val="10005"/>
                   </a:ext>
                 </a:extLst>
               </a:tr>
@@ -27801,7 +26753,7 @@
                 </a:tc>
                 <a:extLst>
                   <a:ext uri="{0D108BD9-81ED-4DB2-BD59-A6C34878D82A}">
-                    <a16:rowId xmlns:a16="http://schemas.microsoft.com/office/drawing/2014/main" val="10006"/>
+                    <a16:rowId xmlns:a16="http://schemas.microsoft.com/office/drawing/2014/main" xmlns="" val="10006"/>
                   </a:ext>
                 </a:extLst>
               </a:tr>
@@ -31597,21 +30549,21 @@
                 <a:gridCol w="371974">
                   <a:extLst>
                     <a:ext uri="{9D8B030D-6E8A-4147-A177-3AD203B41FA5}">
-                      <a16:colId xmlns:a16="http://schemas.microsoft.com/office/drawing/2014/main" val="20000"/>
+                      <a16:colId xmlns:a16="http://schemas.microsoft.com/office/drawing/2014/main" xmlns="" val="20000"/>
                     </a:ext>
                   </a:extLst>
                 </a:gridCol>
                 <a:gridCol w="1800774">
                   <a:extLst>
                     <a:ext uri="{9D8B030D-6E8A-4147-A177-3AD203B41FA5}">
-                      <a16:colId xmlns:a16="http://schemas.microsoft.com/office/drawing/2014/main" val="20001"/>
+                      <a16:colId xmlns:a16="http://schemas.microsoft.com/office/drawing/2014/main" xmlns="" val="20001"/>
                     </a:ext>
                   </a:extLst>
                 </a:gridCol>
                 <a:gridCol w="6540220">
                   <a:extLst>
                     <a:ext uri="{9D8B030D-6E8A-4147-A177-3AD203B41FA5}">
-                      <a16:colId xmlns:a16="http://schemas.microsoft.com/office/drawing/2014/main" val="20002"/>
+                      <a16:colId xmlns:a16="http://schemas.microsoft.com/office/drawing/2014/main" xmlns="" val="20002"/>
                     </a:ext>
                   </a:extLst>
                 </a:gridCol>
@@ -31694,7 +30646,7 @@
                 </a:tc>
                 <a:extLst>
                   <a:ext uri="{0D108BD9-81ED-4DB2-BD59-A6C34878D82A}">
-                    <a16:rowId xmlns:a16="http://schemas.microsoft.com/office/drawing/2014/main" val="10000"/>
+                    <a16:rowId xmlns:a16="http://schemas.microsoft.com/office/drawing/2014/main" xmlns="" val="10000"/>
                   </a:ext>
                 </a:extLst>
               </a:tr>
@@ -31834,7 +30786,7 @@
                 </a:tc>
                 <a:extLst>
                   <a:ext uri="{0D108BD9-81ED-4DB2-BD59-A6C34878D82A}">
-                    <a16:rowId xmlns:a16="http://schemas.microsoft.com/office/drawing/2014/main" val="10001"/>
+                    <a16:rowId xmlns:a16="http://schemas.microsoft.com/office/drawing/2014/main" xmlns="" val="10001"/>
                   </a:ext>
                 </a:extLst>
               </a:tr>
@@ -31955,7 +30907,7 @@
                 </a:tc>
                 <a:extLst>
                   <a:ext uri="{0D108BD9-81ED-4DB2-BD59-A6C34878D82A}">
-                    <a16:rowId xmlns:a16="http://schemas.microsoft.com/office/drawing/2014/main" val="10002"/>
+                    <a16:rowId xmlns:a16="http://schemas.microsoft.com/office/drawing/2014/main" xmlns="" val="10002"/>
                   </a:ext>
                 </a:extLst>
               </a:tr>
@@ -32095,7 +31047,7 @@
                 </a:tc>
                 <a:extLst>
                   <a:ext uri="{0D108BD9-81ED-4DB2-BD59-A6C34878D82A}">
-                    <a16:rowId xmlns:a16="http://schemas.microsoft.com/office/drawing/2014/main" val="10003"/>
+                    <a16:rowId xmlns:a16="http://schemas.microsoft.com/office/drawing/2014/main" xmlns="" val="10003"/>
                   </a:ext>
                 </a:extLst>
               </a:tr>
@@ -32238,7 +31190,7 @@
                 </a:tc>
                 <a:extLst>
                   <a:ext uri="{0D108BD9-81ED-4DB2-BD59-A6C34878D82A}">
-                    <a16:rowId xmlns:a16="http://schemas.microsoft.com/office/drawing/2014/main" val="10004"/>
+                    <a16:rowId xmlns:a16="http://schemas.microsoft.com/office/drawing/2014/main" xmlns="" val="10004"/>
                   </a:ext>
                 </a:extLst>
               </a:tr>
@@ -32410,7 +31362,7 @@
                 </a:tc>
                 <a:extLst>
                   <a:ext uri="{0D108BD9-81ED-4DB2-BD59-A6C34878D82A}">
-                    <a16:rowId xmlns:a16="http://schemas.microsoft.com/office/drawing/2014/main" val="10005"/>
+                    <a16:rowId xmlns:a16="http://schemas.microsoft.com/office/drawing/2014/main" xmlns="" val="10005"/>
                   </a:ext>
                 </a:extLst>
               </a:tr>
@@ -32553,7 +31505,7 @@
                 </a:tc>
                 <a:extLst>
                   <a:ext uri="{0D108BD9-81ED-4DB2-BD59-A6C34878D82A}">
-                    <a16:rowId xmlns:a16="http://schemas.microsoft.com/office/drawing/2014/main" val="10006"/>
+                    <a16:rowId xmlns:a16="http://schemas.microsoft.com/office/drawing/2014/main" xmlns="" val="10006"/>
                   </a:ext>
                 </a:extLst>
               </a:tr>
@@ -32674,7 +31626,7 @@
                 </a:tc>
                 <a:extLst>
                   <a:ext uri="{0D108BD9-81ED-4DB2-BD59-A6C34878D82A}">
-                    <a16:rowId xmlns:a16="http://schemas.microsoft.com/office/drawing/2014/main" val="10007"/>
+                    <a16:rowId xmlns:a16="http://schemas.microsoft.com/office/drawing/2014/main" xmlns="" val="10007"/>
                   </a:ext>
                 </a:extLst>
               </a:tr>

</xml_diff>